<commit_message>
Added logos etc. and script
replace content in script according to your part
</commit_message>
<xml_diff>
--- a/activemq.pptx
+++ b/activemq.pptx
@@ -8,6 +8,8 @@
     <p:sldId id="256" r:id="rId2"/>
     <p:sldId id="258" r:id="rId3"/>
     <p:sldId id="257" r:id="rId4"/>
+    <p:sldId id="260" r:id="rId5"/>
+    <p:sldId id="261" r:id="rId6"/>
   </p:sldIdLst>
   <p:sldSz cx="12192000" cy="6858000"/>
   <p:notesSz cx="6858000" cy="9144000"/>
@@ -114,6 +116,3171 @@
 </p:presentation>
 </file>
 
+<file path=ppt/diagrams/colors1.xml><?xml version="1.0" encoding="utf-8"?>
+<dgm:colorsDef xmlns:dgm="http://schemas.openxmlformats.org/drawingml/2006/diagram" xmlns:a="http://schemas.openxmlformats.org/drawingml/2006/main" uniqueId="urn:microsoft.com/office/officeart/2018/5/colors/Iconchunking_neutralbg_colorful5">
+  <dgm:title val=""/>
+  <dgm:desc val=""/>
+  <dgm:catLst>
+    <dgm:cat type="colorful" pri="10500"/>
+  </dgm:catLst>
+  <dgm:styleLbl name="node0">
+    <dgm:fillClrLst meth="repeat">
+      <a:schemeClr val="accent4"/>
+    </dgm:fillClrLst>
+    <dgm:linClrLst meth="repeat">
+      <a:schemeClr val="lt1"/>
+    </dgm:linClrLst>
+    <dgm:effectClrLst/>
+    <dgm:txLinClrLst/>
+    <dgm:txFillClrLst/>
+    <dgm:txEffectClrLst/>
+  </dgm:styleLbl>
+  <dgm:styleLbl name="node1">
+    <dgm:fillClrLst>
+      <a:schemeClr val="accent5"/>
+      <a:schemeClr val="accent6"/>
+    </dgm:fillClrLst>
+    <dgm:linClrLst meth="repeat">
+      <a:schemeClr val="lt1">
+        <a:alpha val="0"/>
+      </a:schemeClr>
+    </dgm:linClrLst>
+    <dgm:effectClrLst/>
+    <dgm:txLinClrLst/>
+    <dgm:txFillClrLst/>
+    <dgm:txEffectClrLst/>
+  </dgm:styleLbl>
+  <dgm:styleLbl name="alignNode1">
+    <dgm:fillClrLst>
+      <a:schemeClr val="accent5"/>
+      <a:schemeClr val="accent6"/>
+    </dgm:fillClrLst>
+    <dgm:linClrLst>
+      <a:schemeClr val="accent5"/>
+      <a:schemeClr val="accent6"/>
+    </dgm:linClrLst>
+    <dgm:effectClrLst/>
+    <dgm:txLinClrLst/>
+    <dgm:txFillClrLst/>
+    <dgm:txEffectClrLst/>
+  </dgm:styleLbl>
+  <dgm:styleLbl name="lnNode1">
+    <dgm:fillClrLst>
+      <a:schemeClr val="accent5"/>
+      <a:schemeClr val="accent6"/>
+    </dgm:fillClrLst>
+    <dgm:linClrLst meth="repeat">
+      <a:schemeClr val="lt1"/>
+    </dgm:linClrLst>
+    <dgm:effectClrLst/>
+    <dgm:txLinClrLst/>
+    <dgm:txFillClrLst/>
+    <dgm:txEffectClrLst/>
+  </dgm:styleLbl>
+  <dgm:styleLbl name="vennNode1">
+    <dgm:fillClrLst>
+      <a:schemeClr val="accent5">
+        <a:alpha val="50000"/>
+      </a:schemeClr>
+      <a:schemeClr val="accent6">
+        <a:alpha val="50000"/>
+      </a:schemeClr>
+    </dgm:fillClrLst>
+    <dgm:linClrLst meth="repeat">
+      <a:schemeClr val="lt1"/>
+    </dgm:linClrLst>
+    <dgm:effectClrLst/>
+    <dgm:txLinClrLst/>
+    <dgm:txFillClrLst/>
+    <dgm:txEffectClrLst/>
+  </dgm:styleLbl>
+  <dgm:styleLbl name="node2">
+    <dgm:fillClrLst>
+      <a:schemeClr val="accent6"/>
+    </dgm:fillClrLst>
+    <dgm:linClrLst meth="repeat">
+      <a:schemeClr val="lt1"/>
+    </dgm:linClrLst>
+    <dgm:effectClrLst/>
+    <dgm:txLinClrLst/>
+    <dgm:txFillClrLst/>
+    <dgm:txEffectClrLst/>
+  </dgm:styleLbl>
+  <dgm:styleLbl name="node3">
+    <dgm:fillClrLst>
+      <a:schemeClr val="accent1"/>
+    </dgm:fillClrLst>
+    <dgm:linClrLst meth="repeat">
+      <a:schemeClr val="lt1"/>
+    </dgm:linClrLst>
+    <dgm:effectClrLst/>
+    <dgm:txLinClrLst/>
+    <dgm:txFillClrLst/>
+    <dgm:txEffectClrLst/>
+  </dgm:styleLbl>
+  <dgm:styleLbl name="node4">
+    <dgm:fillClrLst>
+      <a:schemeClr val="accent2"/>
+    </dgm:fillClrLst>
+    <dgm:linClrLst meth="repeat">
+      <a:schemeClr val="lt1"/>
+    </dgm:linClrLst>
+    <dgm:effectClrLst/>
+    <dgm:txLinClrLst/>
+    <dgm:txFillClrLst/>
+    <dgm:txEffectClrLst/>
+  </dgm:styleLbl>
+  <dgm:styleLbl name="fgImgPlace1">
+    <dgm:fillClrLst>
+      <a:schemeClr val="accent5">
+        <a:tint val="50000"/>
+      </a:schemeClr>
+      <a:schemeClr val="accent6">
+        <a:tint val="50000"/>
+      </a:schemeClr>
+    </dgm:fillClrLst>
+    <dgm:linClrLst meth="repeat">
+      <a:schemeClr val="lt1"/>
+    </dgm:linClrLst>
+    <dgm:effectClrLst/>
+    <dgm:txLinClrLst/>
+    <dgm:txFillClrLst meth="repeat">
+      <a:schemeClr val="lt1"/>
+    </dgm:txFillClrLst>
+    <dgm:txEffectClrLst/>
+  </dgm:styleLbl>
+  <dgm:styleLbl name="alignImgPlace1">
+    <dgm:fillClrLst>
+      <a:schemeClr val="accent5">
+        <a:tint val="50000"/>
+      </a:schemeClr>
+      <a:schemeClr val="accent6">
+        <a:tint val="20000"/>
+      </a:schemeClr>
+    </dgm:fillClrLst>
+    <dgm:linClrLst meth="repeat">
+      <a:schemeClr val="lt1"/>
+    </dgm:linClrLst>
+    <dgm:effectClrLst/>
+    <dgm:txLinClrLst/>
+    <dgm:txFillClrLst meth="repeat">
+      <a:schemeClr val="lt1"/>
+    </dgm:txFillClrLst>
+    <dgm:txEffectClrLst/>
+  </dgm:styleLbl>
+  <dgm:styleLbl name="bgImgPlace1">
+    <dgm:fillClrLst>
+      <a:schemeClr val="accent5">
+        <a:tint val="50000"/>
+      </a:schemeClr>
+      <a:schemeClr val="accent6">
+        <a:tint val="20000"/>
+      </a:schemeClr>
+    </dgm:fillClrLst>
+    <dgm:linClrLst meth="repeat">
+      <a:schemeClr val="lt1"/>
+    </dgm:linClrLst>
+    <dgm:effectClrLst/>
+    <dgm:txLinClrLst/>
+    <dgm:txFillClrLst meth="repeat">
+      <a:schemeClr val="lt1"/>
+    </dgm:txFillClrLst>
+    <dgm:txEffectClrLst/>
+  </dgm:styleLbl>
+  <dgm:styleLbl name="sibTrans2D1">
+    <dgm:fillClrLst>
+      <a:schemeClr val="accent5"/>
+      <a:schemeClr val="accent6"/>
+    </dgm:fillClrLst>
+    <dgm:linClrLst meth="repeat">
+      <a:schemeClr val="lt1"/>
+    </dgm:linClrLst>
+    <dgm:effectClrLst/>
+    <dgm:txLinClrLst/>
+    <dgm:txFillClrLst/>
+    <dgm:txEffectClrLst/>
+  </dgm:styleLbl>
+  <dgm:styleLbl name="fgSibTrans2D1">
+    <dgm:fillClrLst>
+      <a:schemeClr val="accent5"/>
+      <a:schemeClr val="accent6"/>
+    </dgm:fillClrLst>
+    <dgm:linClrLst meth="repeat">
+      <a:schemeClr val="lt1"/>
+    </dgm:linClrLst>
+    <dgm:effectClrLst/>
+    <dgm:txLinClrLst/>
+    <dgm:txFillClrLst meth="repeat">
+      <a:schemeClr val="lt1"/>
+    </dgm:txFillClrLst>
+    <dgm:txEffectClrLst/>
+  </dgm:styleLbl>
+  <dgm:styleLbl name="bgSibTrans2D1">
+    <dgm:fillClrLst>
+      <a:schemeClr val="accent5"/>
+      <a:schemeClr val="accent6"/>
+    </dgm:fillClrLst>
+    <dgm:linClrLst meth="repeat">
+      <a:schemeClr val="lt1"/>
+    </dgm:linClrLst>
+    <dgm:effectClrLst/>
+    <dgm:txLinClrLst/>
+    <dgm:txFillClrLst meth="repeat">
+      <a:schemeClr val="lt1"/>
+    </dgm:txFillClrLst>
+    <dgm:txEffectClrLst/>
+  </dgm:styleLbl>
+  <dgm:styleLbl name="sibTrans1D1">
+    <dgm:fillClrLst/>
+    <dgm:linClrLst>
+      <a:schemeClr val="accent5"/>
+      <a:schemeClr val="accent6"/>
+    </dgm:linClrLst>
+    <dgm:effectClrLst/>
+    <dgm:txLinClrLst/>
+    <dgm:txFillClrLst meth="repeat">
+      <a:schemeClr val="tx1"/>
+    </dgm:txFillClrLst>
+    <dgm:txEffectClrLst/>
+  </dgm:styleLbl>
+  <dgm:styleLbl name="callout">
+    <dgm:fillClrLst meth="repeat">
+      <a:schemeClr val="accent5"/>
+    </dgm:fillClrLst>
+    <dgm:linClrLst meth="repeat">
+      <a:schemeClr val="accent5">
+        <a:tint val="50000"/>
+      </a:schemeClr>
+    </dgm:linClrLst>
+    <dgm:effectClrLst/>
+    <dgm:txLinClrLst/>
+    <dgm:txFillClrLst meth="repeat">
+      <a:schemeClr val="tx1"/>
+    </dgm:txFillClrLst>
+    <dgm:txEffectClrLst/>
+  </dgm:styleLbl>
+  <dgm:styleLbl name="asst0">
+    <dgm:fillClrLst meth="repeat">
+      <a:schemeClr val="accent5"/>
+    </dgm:fillClrLst>
+    <dgm:linClrLst meth="repeat">
+      <a:schemeClr val="lt1">
+        <a:shade val="80000"/>
+      </a:schemeClr>
+    </dgm:linClrLst>
+    <dgm:effectClrLst/>
+    <dgm:txLinClrLst/>
+    <dgm:txFillClrLst/>
+    <dgm:txEffectClrLst/>
+  </dgm:styleLbl>
+  <dgm:styleLbl name="asst1">
+    <dgm:fillClrLst meth="repeat">
+      <a:schemeClr val="accent6"/>
+    </dgm:fillClrLst>
+    <dgm:linClrLst meth="repeat">
+      <a:schemeClr val="lt1">
+        <a:shade val="80000"/>
+      </a:schemeClr>
+    </dgm:linClrLst>
+    <dgm:effectClrLst/>
+    <dgm:txLinClrLst/>
+    <dgm:txFillClrLst/>
+    <dgm:txEffectClrLst/>
+  </dgm:styleLbl>
+  <dgm:styleLbl name="asst2">
+    <dgm:fillClrLst>
+      <a:schemeClr val="accent1"/>
+    </dgm:fillClrLst>
+    <dgm:linClrLst meth="repeat">
+      <a:schemeClr val="lt1"/>
+    </dgm:linClrLst>
+    <dgm:effectClrLst/>
+    <dgm:txLinClrLst/>
+    <dgm:txFillClrLst/>
+    <dgm:txEffectClrLst/>
+  </dgm:styleLbl>
+  <dgm:styleLbl name="asst3">
+    <dgm:fillClrLst>
+      <a:schemeClr val="accent2"/>
+    </dgm:fillClrLst>
+    <dgm:linClrLst meth="repeat">
+      <a:schemeClr val="lt1"/>
+    </dgm:linClrLst>
+    <dgm:effectClrLst/>
+    <dgm:txLinClrLst/>
+    <dgm:txFillClrLst/>
+    <dgm:txEffectClrLst/>
+  </dgm:styleLbl>
+  <dgm:styleLbl name="asst4">
+    <dgm:fillClrLst>
+      <a:schemeClr val="accent3"/>
+    </dgm:fillClrLst>
+    <dgm:linClrLst meth="repeat">
+      <a:schemeClr val="lt1"/>
+    </dgm:linClrLst>
+    <dgm:effectClrLst/>
+    <dgm:txLinClrLst/>
+    <dgm:txFillClrLst/>
+    <dgm:txEffectClrLst/>
+  </dgm:styleLbl>
+  <dgm:styleLbl name="parChTrans2D1">
+    <dgm:fillClrLst meth="repeat">
+      <a:schemeClr val="accent5"/>
+    </dgm:fillClrLst>
+    <dgm:linClrLst meth="repeat">
+      <a:schemeClr val="lt1"/>
+    </dgm:linClrLst>
+    <dgm:effectClrLst/>
+    <dgm:txLinClrLst/>
+    <dgm:txFillClrLst meth="repeat">
+      <a:schemeClr val="lt1"/>
+    </dgm:txFillClrLst>
+    <dgm:txEffectClrLst/>
+  </dgm:styleLbl>
+  <dgm:styleLbl name="parChTrans2D2">
+    <dgm:fillClrLst meth="repeat">
+      <a:schemeClr val="accent6"/>
+    </dgm:fillClrLst>
+    <dgm:linClrLst meth="repeat">
+      <a:schemeClr val="lt1"/>
+    </dgm:linClrLst>
+    <dgm:effectClrLst/>
+    <dgm:txLinClrLst/>
+    <dgm:txFillClrLst/>
+    <dgm:txEffectClrLst/>
+  </dgm:styleLbl>
+  <dgm:styleLbl name="parChTrans2D3">
+    <dgm:fillClrLst meth="repeat">
+      <a:schemeClr val="accent6"/>
+    </dgm:fillClrLst>
+    <dgm:linClrLst meth="repeat">
+      <a:schemeClr val="lt1"/>
+    </dgm:linClrLst>
+    <dgm:effectClrLst/>
+    <dgm:txLinClrLst/>
+    <dgm:txFillClrLst/>
+    <dgm:txEffectClrLst/>
+  </dgm:styleLbl>
+  <dgm:styleLbl name="parChTrans2D4">
+    <dgm:fillClrLst meth="repeat">
+      <a:schemeClr val="accent1"/>
+    </dgm:fillClrLst>
+    <dgm:linClrLst meth="repeat">
+      <a:schemeClr val="lt1"/>
+    </dgm:linClrLst>
+    <dgm:effectClrLst/>
+    <dgm:txLinClrLst/>
+    <dgm:txFillClrLst meth="repeat">
+      <a:schemeClr val="lt1"/>
+    </dgm:txFillClrLst>
+    <dgm:txEffectClrLst/>
+  </dgm:styleLbl>
+  <dgm:styleLbl name="parChTrans1D1">
+    <dgm:fillClrLst meth="repeat">
+      <a:schemeClr val="accent5"/>
+    </dgm:fillClrLst>
+    <dgm:linClrLst meth="repeat">
+      <a:schemeClr val="accent5"/>
+    </dgm:linClrLst>
+    <dgm:effectClrLst/>
+    <dgm:txLinClrLst/>
+    <dgm:txFillClrLst meth="repeat">
+      <a:schemeClr val="tx1"/>
+    </dgm:txFillClrLst>
+    <dgm:txEffectClrLst/>
+  </dgm:styleLbl>
+  <dgm:styleLbl name="parChTrans1D2">
+    <dgm:fillClrLst meth="repeat">
+      <a:schemeClr val="accent6">
+        <a:tint val="90000"/>
+      </a:schemeClr>
+    </dgm:fillClrLst>
+    <dgm:linClrLst meth="repeat">
+      <a:schemeClr val="accent6"/>
+    </dgm:linClrLst>
+    <dgm:effectClrLst/>
+    <dgm:txLinClrLst/>
+    <dgm:txFillClrLst meth="repeat">
+      <a:schemeClr val="tx1"/>
+    </dgm:txFillClrLst>
+    <dgm:txEffectClrLst/>
+  </dgm:styleLbl>
+  <dgm:styleLbl name="parChTrans1D3">
+    <dgm:fillClrLst meth="repeat">
+      <a:schemeClr val="accent6">
+        <a:tint val="70000"/>
+      </a:schemeClr>
+    </dgm:fillClrLst>
+    <dgm:linClrLst meth="repeat">
+      <a:schemeClr val="accent1"/>
+    </dgm:linClrLst>
+    <dgm:effectClrLst/>
+    <dgm:txLinClrLst/>
+    <dgm:txFillClrLst meth="repeat">
+      <a:schemeClr val="tx1"/>
+    </dgm:txFillClrLst>
+    <dgm:txEffectClrLst/>
+  </dgm:styleLbl>
+  <dgm:styleLbl name="parChTrans1D4">
+    <dgm:fillClrLst meth="repeat">
+      <a:schemeClr val="accent6">
+        <a:tint val="50000"/>
+      </a:schemeClr>
+    </dgm:fillClrLst>
+    <dgm:linClrLst meth="repeat">
+      <a:schemeClr val="accent2"/>
+    </dgm:linClrLst>
+    <dgm:effectClrLst/>
+    <dgm:txLinClrLst/>
+    <dgm:txFillClrLst meth="repeat">
+      <a:schemeClr val="tx1"/>
+    </dgm:txFillClrLst>
+    <dgm:txEffectClrLst/>
+  </dgm:styleLbl>
+  <dgm:styleLbl name="fgAcc1">
+    <dgm:fillClrLst meth="repeat">
+      <a:schemeClr val="lt1">
+        <a:alpha val="90000"/>
+      </a:schemeClr>
+    </dgm:fillClrLst>
+    <dgm:linClrLst>
+      <a:schemeClr val="accent5"/>
+      <a:schemeClr val="accent6"/>
+    </dgm:linClrLst>
+    <dgm:effectClrLst/>
+    <dgm:txLinClrLst/>
+    <dgm:txFillClrLst meth="repeat">
+      <a:schemeClr val="dk1"/>
+    </dgm:txFillClrLst>
+    <dgm:txEffectClrLst/>
+  </dgm:styleLbl>
+  <dgm:styleLbl name="conFgAcc1">
+    <dgm:fillClrLst meth="repeat">
+      <a:schemeClr val="lt1">
+        <a:alpha val="90000"/>
+      </a:schemeClr>
+    </dgm:fillClrLst>
+    <dgm:linClrLst>
+      <a:schemeClr val="accent5"/>
+      <a:schemeClr val="accent6"/>
+    </dgm:linClrLst>
+    <dgm:effectClrLst/>
+    <dgm:txLinClrLst/>
+    <dgm:txFillClrLst meth="repeat">
+      <a:schemeClr val="dk1"/>
+    </dgm:txFillClrLst>
+    <dgm:txEffectClrLst/>
+  </dgm:styleLbl>
+  <dgm:styleLbl name="alignAcc1">
+    <dgm:fillClrLst meth="repeat">
+      <a:schemeClr val="lt1">
+        <a:alpha val="90000"/>
+      </a:schemeClr>
+    </dgm:fillClrLst>
+    <dgm:linClrLst>
+      <a:schemeClr val="accent5"/>
+      <a:schemeClr val="accent6"/>
+    </dgm:linClrLst>
+    <dgm:effectClrLst/>
+    <dgm:txLinClrLst/>
+    <dgm:txFillClrLst meth="repeat">
+      <a:schemeClr val="dk1"/>
+    </dgm:txFillClrLst>
+    <dgm:txEffectClrLst/>
+  </dgm:styleLbl>
+  <dgm:styleLbl name="trAlignAcc1">
+    <dgm:fillClrLst meth="repeat">
+      <a:schemeClr val="lt1">
+        <a:alpha val="40000"/>
+      </a:schemeClr>
+    </dgm:fillClrLst>
+    <dgm:linClrLst meth="repeat">
+      <a:schemeClr val="accent5"/>
+    </dgm:linClrLst>
+    <dgm:effectClrLst/>
+    <dgm:txLinClrLst/>
+    <dgm:txFillClrLst meth="repeat">
+      <a:schemeClr val="dk1"/>
+    </dgm:txFillClrLst>
+    <dgm:txEffectClrLst/>
+  </dgm:styleLbl>
+  <dgm:styleLbl name="bgAcc1">
+    <dgm:fillClrLst meth="repeat">
+      <a:schemeClr val="lt1">
+        <a:alpha val="90000"/>
+      </a:schemeClr>
+    </dgm:fillClrLst>
+    <dgm:linClrLst>
+      <a:schemeClr val="accent5"/>
+      <a:schemeClr val="accent6"/>
+    </dgm:linClrLst>
+    <dgm:effectClrLst/>
+    <dgm:txLinClrLst/>
+    <dgm:txFillClrLst meth="repeat">
+      <a:schemeClr val="dk1"/>
+    </dgm:txFillClrLst>
+    <dgm:txEffectClrLst/>
+  </dgm:styleLbl>
+  <dgm:styleLbl name="solidFgAcc1">
+    <dgm:fillClrLst meth="repeat">
+      <a:schemeClr val="lt1"/>
+    </dgm:fillClrLst>
+    <dgm:linClrLst>
+      <a:schemeClr val="accent5"/>
+      <a:schemeClr val="accent6"/>
+    </dgm:linClrLst>
+    <dgm:effectClrLst/>
+    <dgm:txLinClrLst/>
+    <dgm:txFillClrLst meth="repeat">
+      <a:schemeClr val="dk1"/>
+    </dgm:txFillClrLst>
+    <dgm:txEffectClrLst/>
+  </dgm:styleLbl>
+  <dgm:styleLbl name="solidAlignAcc1">
+    <dgm:fillClrLst meth="repeat">
+      <a:schemeClr val="lt1"/>
+    </dgm:fillClrLst>
+    <dgm:linClrLst>
+      <a:schemeClr val="accent5"/>
+      <a:schemeClr val="accent6"/>
+    </dgm:linClrLst>
+    <dgm:effectClrLst/>
+    <dgm:txLinClrLst/>
+    <dgm:txFillClrLst meth="repeat">
+      <a:schemeClr val="dk1"/>
+    </dgm:txFillClrLst>
+    <dgm:txEffectClrLst/>
+  </dgm:styleLbl>
+  <dgm:styleLbl name="solidBgAcc1">
+    <dgm:fillClrLst meth="repeat">
+      <a:schemeClr val="lt1"/>
+    </dgm:fillClrLst>
+    <dgm:linClrLst>
+      <a:schemeClr val="accent5"/>
+      <a:schemeClr val="accent6"/>
+    </dgm:linClrLst>
+    <dgm:effectClrLst/>
+    <dgm:txLinClrLst/>
+    <dgm:txFillClrLst meth="repeat">
+      <a:schemeClr val="dk1"/>
+    </dgm:txFillClrLst>
+    <dgm:txEffectClrLst/>
+  </dgm:styleLbl>
+  <dgm:styleLbl name="fgAccFollowNode1">
+    <dgm:fillClrLst>
+      <a:schemeClr val="accent5">
+        <a:tint val="40000"/>
+        <a:alpha val="90000"/>
+      </a:schemeClr>
+      <a:schemeClr val="accent6">
+        <a:tint val="40000"/>
+        <a:alpha val="90000"/>
+      </a:schemeClr>
+    </dgm:fillClrLst>
+    <dgm:linClrLst>
+      <a:schemeClr val="accent5">
+        <a:tint val="40000"/>
+        <a:alpha val="90000"/>
+      </a:schemeClr>
+      <a:schemeClr val="accent5">
+        <a:tint val="40000"/>
+        <a:alpha val="90000"/>
+      </a:schemeClr>
+    </dgm:linClrLst>
+    <dgm:effectClrLst/>
+    <dgm:txLinClrLst/>
+    <dgm:txFillClrLst meth="repeat">
+      <a:schemeClr val="dk1"/>
+    </dgm:txFillClrLst>
+    <dgm:txEffectClrLst/>
+  </dgm:styleLbl>
+  <dgm:styleLbl name="alignAccFollowNode1">
+    <dgm:fillClrLst>
+      <a:schemeClr val="accent5">
+        <a:tint val="40000"/>
+        <a:alpha val="90000"/>
+      </a:schemeClr>
+      <a:schemeClr val="accent6">
+        <a:tint val="40000"/>
+        <a:alpha val="90000"/>
+      </a:schemeClr>
+    </dgm:fillClrLst>
+    <dgm:linClrLst>
+      <a:schemeClr val="accent5">
+        <a:tint val="40000"/>
+        <a:alpha val="90000"/>
+      </a:schemeClr>
+      <a:schemeClr val="accent6">
+        <a:tint val="40000"/>
+        <a:alpha val="90000"/>
+      </a:schemeClr>
+    </dgm:linClrLst>
+    <dgm:effectClrLst/>
+    <dgm:txLinClrLst/>
+    <dgm:txFillClrLst meth="repeat">
+      <a:schemeClr val="dk1"/>
+    </dgm:txFillClrLst>
+    <dgm:txEffectClrLst/>
+  </dgm:styleLbl>
+  <dgm:styleLbl name="bgAccFollowNode1">
+    <dgm:fillClrLst>
+      <a:schemeClr val="accent5">
+        <a:tint val="40000"/>
+        <a:alpha val="90000"/>
+      </a:schemeClr>
+      <a:schemeClr val="accent6">
+        <a:tint val="40000"/>
+        <a:alpha val="90000"/>
+      </a:schemeClr>
+    </dgm:fillClrLst>
+    <dgm:linClrLst>
+      <a:schemeClr val="accent5">
+        <a:tint val="40000"/>
+        <a:alpha val="90000"/>
+      </a:schemeClr>
+      <a:schemeClr val="accent6">
+        <a:tint val="40000"/>
+        <a:alpha val="90000"/>
+      </a:schemeClr>
+    </dgm:linClrLst>
+    <dgm:effectClrLst/>
+    <dgm:txLinClrLst/>
+    <dgm:txFillClrLst meth="repeat">
+      <a:schemeClr val="dk1"/>
+    </dgm:txFillClrLst>
+    <dgm:txEffectClrLst/>
+  </dgm:styleLbl>
+  <dgm:styleLbl name="fgAcc0">
+    <dgm:fillClrLst meth="repeat">
+      <a:schemeClr val="lt1">
+        <a:alpha val="90000"/>
+      </a:schemeClr>
+    </dgm:fillClrLst>
+    <dgm:linClrLst>
+      <a:schemeClr val="accent4"/>
+    </dgm:linClrLst>
+    <dgm:effectClrLst/>
+    <dgm:txLinClrLst/>
+    <dgm:txFillClrLst meth="repeat">
+      <a:schemeClr val="dk1"/>
+    </dgm:txFillClrLst>
+    <dgm:txEffectClrLst/>
+  </dgm:styleLbl>
+  <dgm:styleLbl name="fgAcc2">
+    <dgm:fillClrLst meth="repeat">
+      <a:schemeClr val="lt1">
+        <a:alpha val="90000"/>
+      </a:schemeClr>
+    </dgm:fillClrLst>
+    <dgm:linClrLst>
+      <a:schemeClr val="accent6"/>
+    </dgm:linClrLst>
+    <dgm:effectClrLst/>
+    <dgm:txLinClrLst/>
+    <dgm:txFillClrLst meth="repeat">
+      <a:schemeClr val="dk1"/>
+    </dgm:txFillClrLst>
+    <dgm:txEffectClrLst/>
+  </dgm:styleLbl>
+  <dgm:styleLbl name="fgAcc3">
+    <dgm:fillClrLst meth="repeat">
+      <a:schemeClr val="lt1">
+        <a:alpha val="90000"/>
+      </a:schemeClr>
+    </dgm:fillClrLst>
+    <dgm:linClrLst>
+      <a:schemeClr val="accent1"/>
+    </dgm:linClrLst>
+    <dgm:effectClrLst/>
+    <dgm:txLinClrLst/>
+    <dgm:txFillClrLst meth="repeat">
+      <a:schemeClr val="dk1"/>
+    </dgm:txFillClrLst>
+    <dgm:txEffectClrLst/>
+  </dgm:styleLbl>
+  <dgm:styleLbl name="fgAcc4">
+    <dgm:fillClrLst meth="repeat">
+      <a:schemeClr val="lt1">
+        <a:alpha val="90000"/>
+      </a:schemeClr>
+    </dgm:fillClrLst>
+    <dgm:linClrLst>
+      <a:schemeClr val="accent2"/>
+    </dgm:linClrLst>
+    <dgm:effectClrLst/>
+    <dgm:txLinClrLst/>
+    <dgm:txFillClrLst meth="repeat">
+      <a:schemeClr val="dk1"/>
+    </dgm:txFillClrLst>
+    <dgm:txEffectClrLst/>
+  </dgm:styleLbl>
+  <dgm:styleLbl name="bgShp">
+    <dgm:fillClrLst meth="repeat">
+      <a:schemeClr val="bg1">
+        <a:lumMod val="95000"/>
+      </a:schemeClr>
+    </dgm:fillClrLst>
+    <dgm:linClrLst meth="repeat">
+      <a:schemeClr val="dk1"/>
+    </dgm:linClrLst>
+    <dgm:effectClrLst/>
+    <dgm:txLinClrLst/>
+    <dgm:txFillClrLst meth="repeat">
+      <a:schemeClr val="dk1"/>
+    </dgm:txFillClrLst>
+    <dgm:txEffectClrLst/>
+  </dgm:styleLbl>
+  <dgm:styleLbl name="dkBgShp">
+    <dgm:fillClrLst meth="repeat">
+      <a:schemeClr val="accent5">
+        <a:shade val="90000"/>
+      </a:schemeClr>
+    </dgm:fillClrLst>
+    <dgm:linClrLst meth="repeat">
+      <a:schemeClr val="dk1"/>
+    </dgm:linClrLst>
+    <dgm:effectClrLst/>
+    <dgm:txLinClrLst/>
+    <dgm:txFillClrLst meth="repeat">
+      <a:schemeClr val="lt1"/>
+    </dgm:txFillClrLst>
+    <dgm:txEffectClrLst/>
+  </dgm:styleLbl>
+  <dgm:styleLbl name="trBgShp">
+    <dgm:fillClrLst meth="repeat">
+      <a:schemeClr val="accent5">
+        <a:tint val="50000"/>
+        <a:alpha val="40000"/>
+      </a:schemeClr>
+    </dgm:fillClrLst>
+    <dgm:linClrLst meth="repeat">
+      <a:schemeClr val="accent5"/>
+    </dgm:linClrLst>
+    <dgm:effectClrLst/>
+    <dgm:txLinClrLst/>
+    <dgm:txFillClrLst meth="repeat">
+      <a:schemeClr val="lt1"/>
+    </dgm:txFillClrLst>
+    <dgm:txEffectClrLst/>
+  </dgm:styleLbl>
+  <dgm:styleLbl name="fgShp">
+    <dgm:fillClrLst meth="repeat">
+      <a:schemeClr val="accent5">
+        <a:tint val="40000"/>
+      </a:schemeClr>
+    </dgm:fillClrLst>
+    <dgm:linClrLst meth="repeat">
+      <a:schemeClr val="lt1"/>
+    </dgm:linClrLst>
+    <dgm:effectClrLst/>
+    <dgm:txLinClrLst/>
+    <dgm:txFillClrLst meth="repeat">
+      <a:schemeClr val="dk1"/>
+    </dgm:txFillClrLst>
+    <dgm:txEffectClrLst/>
+  </dgm:styleLbl>
+  <dgm:styleLbl name="revTx">
+    <dgm:fillClrLst meth="repeat">
+      <a:schemeClr val="lt1">
+        <a:alpha val="0"/>
+      </a:schemeClr>
+    </dgm:fillClrLst>
+    <dgm:linClrLst meth="repeat">
+      <a:schemeClr val="dk1">
+        <a:alpha val="0"/>
+      </a:schemeClr>
+    </dgm:linClrLst>
+    <dgm:effectClrLst/>
+    <dgm:txLinClrLst/>
+    <dgm:txFillClrLst meth="repeat">
+      <a:schemeClr val="tx1"/>
+    </dgm:txFillClrLst>
+    <dgm:txEffectClrLst/>
+  </dgm:styleLbl>
+</dgm:colorsDef>
+</file>
+
+<file path=ppt/diagrams/data1.xml><?xml version="1.0" encoding="utf-8"?>
+<dgm:dataModel xmlns:dgm="http://schemas.openxmlformats.org/drawingml/2006/diagram" xmlns:a="http://schemas.openxmlformats.org/drawingml/2006/main">
+  <dgm:ptLst>
+    <dgm:pt modelId="{2F95C1F8-A501-498B-9BCA-D8954745FC11}" type="doc">
+      <dgm:prSet loTypeId="urn:microsoft.com/office/officeart/2018/5/layout/IconLeafLabelList" loCatId="icon" qsTypeId="urn:microsoft.com/office/officeart/2005/8/quickstyle/simple1" qsCatId="simple" csTypeId="urn:microsoft.com/office/officeart/2018/5/colors/Iconchunking_neutralbg_colorful5" csCatId="colorful" phldr="1"/>
+      <dgm:spPr/>
+      <dgm:t>
+        <a:bodyPr/>
+        <a:lstStyle/>
+        <a:p>
+          <a:endParaRPr lang="en-US"/>
+        </a:p>
+      </dgm:t>
+    </dgm:pt>
+    <dgm:pt modelId="{A9769D80-3D9C-41C4-A152-05A8761A4455}">
+      <dgm:prSet/>
+      <dgm:spPr/>
+      <dgm:t>
+        <a:bodyPr/>
+        <a:lstStyle/>
+        <a:p>
+          <a:pPr>
+            <a:lnSpc>
+              <a:spcPct val="100000"/>
+            </a:lnSpc>
+            <a:defRPr cap="all"/>
+          </a:pPr>
+          <a:r>
+            <a:rPr lang="en-US" dirty="0">
+              <a:latin typeface="+mn-lt"/>
+            </a:rPr>
+            <a:t>Developed by the </a:t>
+          </a:r>
+          <a:r>
+            <a:rPr lang="en-US" dirty="0">
+              <a:latin typeface="+mn-lt"/>
+              <a:hlinkClick xmlns:r="http://schemas.openxmlformats.org/officeDocument/2006/relationships" r:id="rId1"/>
+            </a:rPr>
+            <a:t>Apache Software Foundation</a:t>
+          </a:r>
+          <a:endParaRPr lang="en-US" dirty="0">
+            <a:latin typeface="+mn-lt"/>
+          </a:endParaRPr>
+        </a:p>
+      </dgm:t>
+    </dgm:pt>
+    <dgm:pt modelId="{3FEF808D-82C4-4199-871F-B89B9632DB53}" type="parTrans" cxnId="{9189B4E5-1FAF-4768-86B4-011617BD49C2}">
+      <dgm:prSet/>
+      <dgm:spPr/>
+      <dgm:t>
+        <a:bodyPr/>
+        <a:lstStyle/>
+        <a:p>
+          <a:endParaRPr lang="en-US"/>
+        </a:p>
+      </dgm:t>
+    </dgm:pt>
+    <dgm:pt modelId="{B76FF107-C17E-40FD-8D23-F21DBBE1E30B}" type="sibTrans" cxnId="{9189B4E5-1FAF-4768-86B4-011617BD49C2}">
+      <dgm:prSet/>
+      <dgm:spPr/>
+      <dgm:t>
+        <a:bodyPr/>
+        <a:lstStyle/>
+        <a:p>
+          <a:endParaRPr lang="en-US"/>
+        </a:p>
+      </dgm:t>
+    </dgm:pt>
+    <dgm:pt modelId="{DD706381-7816-411C-8827-863AEC6052EA}">
+      <dgm:prSet/>
+      <dgm:spPr/>
+      <dgm:t>
+        <a:bodyPr/>
+        <a:lstStyle/>
+        <a:p>
+          <a:pPr>
+            <a:lnSpc>
+              <a:spcPct val="100000"/>
+            </a:lnSpc>
+            <a:defRPr cap="all"/>
+          </a:pPr>
+          <a:r>
+            <a:rPr lang="en-US"/>
+            <a:t>Message-oriented middleware (MOM)</a:t>
+          </a:r>
+        </a:p>
+      </dgm:t>
+    </dgm:pt>
+    <dgm:pt modelId="{2F4BFF8B-AD4F-413A-877F-0F7ABE1E8CDE}" type="parTrans" cxnId="{1C640FAA-F423-43E4-A2DE-B6564D0A2746}">
+      <dgm:prSet/>
+      <dgm:spPr/>
+      <dgm:t>
+        <a:bodyPr/>
+        <a:lstStyle/>
+        <a:p>
+          <a:endParaRPr lang="en-US"/>
+        </a:p>
+      </dgm:t>
+    </dgm:pt>
+    <dgm:pt modelId="{53656E5C-3798-4EFF-AE59-C02326E309A1}" type="sibTrans" cxnId="{1C640FAA-F423-43E4-A2DE-B6564D0A2746}">
+      <dgm:prSet/>
+      <dgm:spPr/>
+      <dgm:t>
+        <a:bodyPr/>
+        <a:lstStyle/>
+        <a:p>
+          <a:endParaRPr lang="en-US"/>
+        </a:p>
+      </dgm:t>
+    </dgm:pt>
+    <dgm:pt modelId="{10185A1A-E2A9-48FF-9BD3-AFFC35803E9F}">
+      <dgm:prSet/>
+      <dgm:spPr/>
+      <dgm:t>
+        <a:bodyPr/>
+        <a:lstStyle/>
+        <a:p>
+          <a:pPr>
+            <a:lnSpc>
+              <a:spcPct val="100000"/>
+            </a:lnSpc>
+            <a:defRPr cap="all"/>
+          </a:pPr>
+          <a:r>
+            <a:rPr lang="en-US"/>
+            <a:t>Allows loose coupling of the elements</a:t>
+          </a:r>
+        </a:p>
+      </dgm:t>
+    </dgm:pt>
+    <dgm:pt modelId="{800563E3-BF02-4E63-890C-A26531DDCBC8}" type="parTrans" cxnId="{597CB97F-9179-4AE3-97BD-17188FE000FB}">
+      <dgm:prSet/>
+      <dgm:spPr/>
+      <dgm:t>
+        <a:bodyPr/>
+        <a:lstStyle/>
+        <a:p>
+          <a:endParaRPr lang="en-US"/>
+        </a:p>
+      </dgm:t>
+    </dgm:pt>
+    <dgm:pt modelId="{7D9CF3B2-0A16-49C3-BA7F-65BA640F61CD}" type="sibTrans" cxnId="{597CB97F-9179-4AE3-97BD-17188FE000FB}">
+      <dgm:prSet/>
+      <dgm:spPr/>
+      <dgm:t>
+        <a:bodyPr/>
+        <a:lstStyle/>
+        <a:p>
+          <a:endParaRPr lang="en-US"/>
+        </a:p>
+      </dgm:t>
+    </dgm:pt>
+    <dgm:pt modelId="{8E0C4D9F-A935-4DF5-9717-A595449C0EBF}">
+      <dgm:prSet/>
+      <dgm:spPr/>
+      <dgm:t>
+        <a:bodyPr/>
+        <a:lstStyle/>
+        <a:p>
+          <a:pPr>
+            <a:lnSpc>
+              <a:spcPct val="100000"/>
+            </a:lnSpc>
+            <a:defRPr cap="all"/>
+          </a:pPr>
+          <a:r>
+            <a:rPr lang="en-US"/>
+            <a:t>Java based-makes use of the Java Message Service (JMS) API</a:t>
+          </a:r>
+        </a:p>
+      </dgm:t>
+    </dgm:pt>
+    <dgm:pt modelId="{DD3CDE15-0847-4304-9708-3839C7503FCE}" type="parTrans" cxnId="{6938EFF2-55D6-489E-8DB7-4EFBA5DD1DBC}">
+      <dgm:prSet/>
+      <dgm:spPr/>
+      <dgm:t>
+        <a:bodyPr/>
+        <a:lstStyle/>
+        <a:p>
+          <a:endParaRPr lang="en-US"/>
+        </a:p>
+      </dgm:t>
+    </dgm:pt>
+    <dgm:pt modelId="{74205D37-C4FC-43A6-BE89-7DCA7E1F9717}" type="sibTrans" cxnId="{6938EFF2-55D6-489E-8DB7-4EFBA5DD1DBC}">
+      <dgm:prSet/>
+      <dgm:spPr/>
+      <dgm:t>
+        <a:bodyPr/>
+        <a:lstStyle/>
+        <a:p>
+          <a:endParaRPr lang="en-US"/>
+        </a:p>
+      </dgm:t>
+    </dgm:pt>
+    <dgm:pt modelId="{DC4AC02F-D5BA-4A28-979A-CD99B5AE9BBC}" type="pres">
+      <dgm:prSet presAssocID="{2F95C1F8-A501-498B-9BCA-D8954745FC11}" presName="root" presStyleCnt="0">
+        <dgm:presLayoutVars>
+          <dgm:dir/>
+          <dgm:resizeHandles val="exact"/>
+        </dgm:presLayoutVars>
+      </dgm:prSet>
+      <dgm:spPr/>
+    </dgm:pt>
+    <dgm:pt modelId="{487FAA2F-F228-41B7-BC5F-FBD7D1110CB3}" type="pres">
+      <dgm:prSet presAssocID="{A9769D80-3D9C-41C4-A152-05A8761A4455}" presName="compNode" presStyleCnt="0"/>
+      <dgm:spPr/>
+    </dgm:pt>
+    <dgm:pt modelId="{A29E99C5-61CD-4F4C-8EC2-274C5B64A599}" type="pres">
+      <dgm:prSet presAssocID="{A9769D80-3D9C-41C4-A152-05A8761A4455}" presName="iconBgRect" presStyleLbl="bgShp" presStyleIdx="0" presStyleCnt="4"/>
+      <dgm:spPr>
+        <a:prstGeom prst="round2DiagRect">
+          <a:avLst>
+            <a:gd name="adj1" fmla="val 29727"/>
+            <a:gd name="adj2" fmla="val 0"/>
+          </a:avLst>
+        </a:prstGeom>
+      </dgm:spPr>
+    </dgm:pt>
+    <dgm:pt modelId="{DD1B885E-07DD-4749-99EF-B2EC3FDA3992}" type="pres">
+      <dgm:prSet presAssocID="{A9769D80-3D9C-41C4-A152-05A8761A4455}" presName="iconRect" presStyleLbl="node1" presStyleIdx="0" presStyleCnt="4"/>
+      <dgm:spPr>
+        <a:blipFill>
+          <a:blip xmlns:r="http://schemas.openxmlformats.org/officeDocument/2006/relationships" r:embed="rId2">
+            <a:extLst>
+              <a:ext uri="{28A0092B-C50C-407E-A947-70E740481C1C}">
+                <a14:useLocalDpi xmlns:a14="http://schemas.microsoft.com/office/drawing/2010/main" val="0"/>
+              </a:ext>
+              <a:ext uri="{96DAC541-7B7A-43D3-8B79-37D633B846F1}">
+                <asvg:svgBlip xmlns:asvg="http://schemas.microsoft.com/office/drawing/2016/SVG/main" r:embed="rId3"/>
+              </a:ext>
+            </a:extLst>
+          </a:blip>
+          <a:stretch>
+            <a:fillRect/>
+          </a:stretch>
+        </a:blipFill>
+        <a:ln>
+          <a:noFill/>
+        </a:ln>
+      </dgm:spPr>
+      <dgm:extLst>
+        <a:ext uri="{E40237B7-FDA0-4F09-8148-C483321AD2D9}">
+          <dgm14:cNvPr xmlns:dgm14="http://schemas.microsoft.com/office/drawing/2010/diagram" id="0" name="" descr="Cloud Computing"/>
+        </a:ext>
+      </dgm:extLst>
+    </dgm:pt>
+    <dgm:pt modelId="{127B2AD1-56F2-4AF3-AF8B-61D2166DFD94}" type="pres">
+      <dgm:prSet presAssocID="{A9769D80-3D9C-41C4-A152-05A8761A4455}" presName="spaceRect" presStyleCnt="0"/>
+      <dgm:spPr/>
+    </dgm:pt>
+    <dgm:pt modelId="{E0454BDA-BE3E-44FB-94FF-1D6F636F52A2}" type="pres">
+      <dgm:prSet presAssocID="{A9769D80-3D9C-41C4-A152-05A8761A4455}" presName="textRect" presStyleLbl="revTx" presStyleIdx="0" presStyleCnt="4">
+        <dgm:presLayoutVars>
+          <dgm:chMax val="1"/>
+          <dgm:chPref val="1"/>
+        </dgm:presLayoutVars>
+      </dgm:prSet>
+      <dgm:spPr/>
+    </dgm:pt>
+    <dgm:pt modelId="{2BAA1A67-6C05-48FD-8449-941474F946C5}" type="pres">
+      <dgm:prSet presAssocID="{B76FF107-C17E-40FD-8D23-F21DBBE1E30B}" presName="sibTrans" presStyleCnt="0"/>
+      <dgm:spPr/>
+    </dgm:pt>
+    <dgm:pt modelId="{A7ACCA1A-E388-433C-ACE5-080F94265B5C}" type="pres">
+      <dgm:prSet presAssocID="{DD706381-7816-411C-8827-863AEC6052EA}" presName="compNode" presStyleCnt="0"/>
+      <dgm:spPr/>
+    </dgm:pt>
+    <dgm:pt modelId="{64E685C7-48C5-408D-829E-D84DAB553A87}" type="pres">
+      <dgm:prSet presAssocID="{DD706381-7816-411C-8827-863AEC6052EA}" presName="iconBgRect" presStyleLbl="bgShp" presStyleIdx="1" presStyleCnt="4"/>
+      <dgm:spPr>
+        <a:prstGeom prst="round2DiagRect">
+          <a:avLst>
+            <a:gd name="adj1" fmla="val 29727"/>
+            <a:gd name="adj2" fmla="val 0"/>
+          </a:avLst>
+        </a:prstGeom>
+      </dgm:spPr>
+    </dgm:pt>
+    <dgm:pt modelId="{91D0E9FC-0453-434B-81A4-F8D592CC2A35}" type="pres">
+      <dgm:prSet presAssocID="{DD706381-7816-411C-8827-863AEC6052EA}" presName="iconRect" presStyleLbl="node1" presStyleIdx="1" presStyleCnt="4"/>
+      <dgm:spPr>
+        <a:blipFill>
+          <a:blip xmlns:r="http://schemas.openxmlformats.org/officeDocument/2006/relationships" r:embed="rId4">
+            <a:extLst>
+              <a:ext uri="{28A0092B-C50C-407E-A947-70E740481C1C}">
+                <a14:useLocalDpi xmlns:a14="http://schemas.microsoft.com/office/drawing/2010/main" val="0"/>
+              </a:ext>
+              <a:ext uri="{96DAC541-7B7A-43D3-8B79-37D633B846F1}">
+                <asvg:svgBlip xmlns:asvg="http://schemas.microsoft.com/office/drawing/2016/SVG/main" r:embed="rId5"/>
+              </a:ext>
+            </a:extLst>
+          </a:blip>
+          <a:stretch>
+            <a:fillRect/>
+          </a:stretch>
+        </a:blipFill>
+        <a:ln>
+          <a:noFill/>
+        </a:ln>
+      </dgm:spPr>
+      <dgm:extLst>
+        <a:ext uri="{E40237B7-FDA0-4F09-8148-C483321AD2D9}">
+          <dgm14:cNvPr xmlns:dgm14="http://schemas.microsoft.com/office/drawing/2010/diagram" id="0" name="" descr="Envelope"/>
+        </a:ext>
+      </dgm:extLst>
+    </dgm:pt>
+    <dgm:pt modelId="{8EB0A249-DC02-4B93-A87F-36E6EC8DF9D1}" type="pres">
+      <dgm:prSet presAssocID="{DD706381-7816-411C-8827-863AEC6052EA}" presName="spaceRect" presStyleCnt="0"/>
+      <dgm:spPr/>
+    </dgm:pt>
+    <dgm:pt modelId="{6718CC1F-304B-4C1C-9C4A-8437F7E90DE5}" type="pres">
+      <dgm:prSet presAssocID="{DD706381-7816-411C-8827-863AEC6052EA}" presName="textRect" presStyleLbl="revTx" presStyleIdx="1" presStyleCnt="4">
+        <dgm:presLayoutVars>
+          <dgm:chMax val="1"/>
+          <dgm:chPref val="1"/>
+        </dgm:presLayoutVars>
+      </dgm:prSet>
+      <dgm:spPr/>
+    </dgm:pt>
+    <dgm:pt modelId="{FA2C1D61-E625-40EB-8D5F-A97BECD0E014}" type="pres">
+      <dgm:prSet presAssocID="{53656E5C-3798-4EFF-AE59-C02326E309A1}" presName="sibTrans" presStyleCnt="0"/>
+      <dgm:spPr/>
+    </dgm:pt>
+    <dgm:pt modelId="{87889843-BB43-437B-9515-0030D4A5402B}" type="pres">
+      <dgm:prSet presAssocID="{10185A1A-E2A9-48FF-9BD3-AFFC35803E9F}" presName="compNode" presStyleCnt="0"/>
+      <dgm:spPr/>
+    </dgm:pt>
+    <dgm:pt modelId="{4E583FB2-9103-4C12-9DDD-6D4135381072}" type="pres">
+      <dgm:prSet presAssocID="{10185A1A-E2A9-48FF-9BD3-AFFC35803E9F}" presName="iconBgRect" presStyleLbl="bgShp" presStyleIdx="2" presStyleCnt="4"/>
+      <dgm:spPr>
+        <a:prstGeom prst="round2DiagRect">
+          <a:avLst>
+            <a:gd name="adj1" fmla="val 29727"/>
+            <a:gd name="adj2" fmla="val 0"/>
+          </a:avLst>
+        </a:prstGeom>
+      </dgm:spPr>
+    </dgm:pt>
+    <dgm:pt modelId="{B369BE71-5E31-4C28-A810-B7793A802C21}" type="pres">
+      <dgm:prSet presAssocID="{10185A1A-E2A9-48FF-9BD3-AFFC35803E9F}" presName="iconRect" presStyleLbl="node1" presStyleIdx="2" presStyleCnt="4"/>
+      <dgm:spPr>
+        <a:blipFill>
+          <a:blip xmlns:r="http://schemas.openxmlformats.org/officeDocument/2006/relationships" r:embed="rId6">
+            <a:extLst>
+              <a:ext uri="{28A0092B-C50C-407E-A947-70E740481C1C}">
+                <a14:useLocalDpi xmlns:a14="http://schemas.microsoft.com/office/drawing/2010/main" val="0"/>
+              </a:ext>
+              <a:ext uri="{96DAC541-7B7A-43D3-8B79-37D633B846F1}">
+                <asvg:svgBlip xmlns:asvg="http://schemas.microsoft.com/office/drawing/2016/SVG/main" r:embed="rId7"/>
+              </a:ext>
+            </a:extLst>
+          </a:blip>
+          <a:stretch>
+            <a:fillRect/>
+          </a:stretch>
+        </a:blipFill>
+        <a:ln>
+          <a:noFill/>
+        </a:ln>
+      </dgm:spPr>
+      <dgm:extLst>
+        <a:ext uri="{E40237B7-FDA0-4F09-8148-C483321AD2D9}">
+          <dgm14:cNvPr xmlns:dgm14="http://schemas.microsoft.com/office/drawing/2010/diagram" id="0" name="" descr="Disconnected"/>
+        </a:ext>
+      </dgm:extLst>
+    </dgm:pt>
+    <dgm:pt modelId="{13AA6616-4331-46E3-B9BD-BD3039B666BC}" type="pres">
+      <dgm:prSet presAssocID="{10185A1A-E2A9-48FF-9BD3-AFFC35803E9F}" presName="spaceRect" presStyleCnt="0"/>
+      <dgm:spPr/>
+    </dgm:pt>
+    <dgm:pt modelId="{D605DE3E-38B7-4866-8160-02CAFD82A033}" type="pres">
+      <dgm:prSet presAssocID="{10185A1A-E2A9-48FF-9BD3-AFFC35803E9F}" presName="textRect" presStyleLbl="revTx" presStyleIdx="2" presStyleCnt="4">
+        <dgm:presLayoutVars>
+          <dgm:chMax val="1"/>
+          <dgm:chPref val="1"/>
+        </dgm:presLayoutVars>
+      </dgm:prSet>
+      <dgm:spPr/>
+    </dgm:pt>
+    <dgm:pt modelId="{845DA130-4D43-4E95-93ED-79209D3480B8}" type="pres">
+      <dgm:prSet presAssocID="{7D9CF3B2-0A16-49C3-BA7F-65BA640F61CD}" presName="sibTrans" presStyleCnt="0"/>
+      <dgm:spPr/>
+    </dgm:pt>
+    <dgm:pt modelId="{6E708299-FFC7-49AC-BE53-7B604D84FF4E}" type="pres">
+      <dgm:prSet presAssocID="{8E0C4D9F-A935-4DF5-9717-A595449C0EBF}" presName="compNode" presStyleCnt="0"/>
+      <dgm:spPr/>
+    </dgm:pt>
+    <dgm:pt modelId="{0A4CA08E-A087-4DB4-990B-AFF04BD9D28B}" type="pres">
+      <dgm:prSet presAssocID="{8E0C4D9F-A935-4DF5-9717-A595449C0EBF}" presName="iconBgRect" presStyleLbl="bgShp" presStyleIdx="3" presStyleCnt="4"/>
+      <dgm:spPr>
+        <a:prstGeom prst="round2DiagRect">
+          <a:avLst>
+            <a:gd name="adj1" fmla="val 29727"/>
+            <a:gd name="adj2" fmla="val 0"/>
+          </a:avLst>
+        </a:prstGeom>
+      </dgm:spPr>
+    </dgm:pt>
+    <dgm:pt modelId="{8400DD4C-38F9-4056-93D0-D4424B77D865}" type="pres">
+      <dgm:prSet presAssocID="{8E0C4D9F-A935-4DF5-9717-A595449C0EBF}" presName="iconRect" presStyleLbl="node1" presStyleIdx="3" presStyleCnt="4"/>
+      <dgm:spPr>
+        <a:blipFill>
+          <a:blip xmlns:r="http://schemas.openxmlformats.org/officeDocument/2006/relationships" r:embed="rId8">
+            <a:extLst>
+              <a:ext uri="{28A0092B-C50C-407E-A947-70E740481C1C}">
+                <a14:useLocalDpi xmlns:a14="http://schemas.microsoft.com/office/drawing/2010/main" val="0"/>
+              </a:ext>
+              <a:ext uri="{96DAC541-7B7A-43D3-8B79-37D633B846F1}">
+                <asvg:svgBlip xmlns:asvg="http://schemas.microsoft.com/office/drawing/2016/SVG/main" r:embed="rId9"/>
+              </a:ext>
+            </a:extLst>
+          </a:blip>
+          <a:stretch>
+            <a:fillRect/>
+          </a:stretch>
+        </a:blipFill>
+        <a:ln>
+          <a:noFill/>
+        </a:ln>
+      </dgm:spPr>
+      <dgm:extLst>
+        <a:ext uri="{E40237B7-FDA0-4F09-8148-C483321AD2D9}">
+          <dgm14:cNvPr xmlns:dgm14="http://schemas.microsoft.com/office/drawing/2010/diagram" id="0" name="" descr="Processor"/>
+        </a:ext>
+      </dgm:extLst>
+    </dgm:pt>
+    <dgm:pt modelId="{9F5A2D1F-441B-4F8B-A0C6-370C1A02E678}" type="pres">
+      <dgm:prSet presAssocID="{8E0C4D9F-A935-4DF5-9717-A595449C0EBF}" presName="spaceRect" presStyleCnt="0"/>
+      <dgm:spPr/>
+    </dgm:pt>
+    <dgm:pt modelId="{6DCEA4BC-39A5-4150-A7BD-875EACADB5DF}" type="pres">
+      <dgm:prSet presAssocID="{8E0C4D9F-A935-4DF5-9717-A595449C0EBF}" presName="textRect" presStyleLbl="revTx" presStyleIdx="3" presStyleCnt="4">
+        <dgm:presLayoutVars>
+          <dgm:chMax val="1"/>
+          <dgm:chPref val="1"/>
+        </dgm:presLayoutVars>
+      </dgm:prSet>
+      <dgm:spPr/>
+    </dgm:pt>
+  </dgm:ptLst>
+  <dgm:cxnLst>
+    <dgm:cxn modelId="{850F7818-8C8E-478C-B075-8B49AB6AD8B9}" type="presOf" srcId="{2F95C1F8-A501-498B-9BCA-D8954745FC11}" destId="{DC4AC02F-D5BA-4A28-979A-CD99B5AE9BBC}" srcOrd="0" destOrd="0" presId="urn:microsoft.com/office/officeart/2018/5/layout/IconLeafLabelList"/>
+    <dgm:cxn modelId="{05CB6F5D-62AF-4327-AE21-7088EE157DEB}" type="presOf" srcId="{A9769D80-3D9C-41C4-A152-05A8761A4455}" destId="{E0454BDA-BE3E-44FB-94FF-1D6F636F52A2}" srcOrd="0" destOrd="0" presId="urn:microsoft.com/office/officeart/2018/5/layout/IconLeafLabelList"/>
+    <dgm:cxn modelId="{53E7E95F-A1F8-4819-A984-942D01798D07}" type="presOf" srcId="{10185A1A-E2A9-48FF-9BD3-AFFC35803E9F}" destId="{D605DE3E-38B7-4866-8160-02CAFD82A033}" srcOrd="0" destOrd="0" presId="urn:microsoft.com/office/officeart/2018/5/layout/IconLeafLabelList"/>
+    <dgm:cxn modelId="{597CB97F-9179-4AE3-97BD-17188FE000FB}" srcId="{2F95C1F8-A501-498B-9BCA-D8954745FC11}" destId="{10185A1A-E2A9-48FF-9BD3-AFFC35803E9F}" srcOrd="2" destOrd="0" parTransId="{800563E3-BF02-4E63-890C-A26531DDCBC8}" sibTransId="{7D9CF3B2-0A16-49C3-BA7F-65BA640F61CD}"/>
+    <dgm:cxn modelId="{93DF83A8-25D6-4563-B186-06FD9934933D}" type="presOf" srcId="{8E0C4D9F-A935-4DF5-9717-A595449C0EBF}" destId="{6DCEA4BC-39A5-4150-A7BD-875EACADB5DF}" srcOrd="0" destOrd="0" presId="urn:microsoft.com/office/officeart/2018/5/layout/IconLeafLabelList"/>
+    <dgm:cxn modelId="{1C640FAA-F423-43E4-A2DE-B6564D0A2746}" srcId="{2F95C1F8-A501-498B-9BCA-D8954745FC11}" destId="{DD706381-7816-411C-8827-863AEC6052EA}" srcOrd="1" destOrd="0" parTransId="{2F4BFF8B-AD4F-413A-877F-0F7ABE1E8CDE}" sibTransId="{53656E5C-3798-4EFF-AE59-C02326E309A1}"/>
+    <dgm:cxn modelId="{A69857AB-A0BD-4535-B964-3D184824E63D}" type="presOf" srcId="{DD706381-7816-411C-8827-863AEC6052EA}" destId="{6718CC1F-304B-4C1C-9C4A-8437F7E90DE5}" srcOrd="0" destOrd="0" presId="urn:microsoft.com/office/officeart/2018/5/layout/IconLeafLabelList"/>
+    <dgm:cxn modelId="{9189B4E5-1FAF-4768-86B4-011617BD49C2}" srcId="{2F95C1F8-A501-498B-9BCA-D8954745FC11}" destId="{A9769D80-3D9C-41C4-A152-05A8761A4455}" srcOrd="0" destOrd="0" parTransId="{3FEF808D-82C4-4199-871F-B89B9632DB53}" sibTransId="{B76FF107-C17E-40FD-8D23-F21DBBE1E30B}"/>
+    <dgm:cxn modelId="{6938EFF2-55D6-489E-8DB7-4EFBA5DD1DBC}" srcId="{2F95C1F8-A501-498B-9BCA-D8954745FC11}" destId="{8E0C4D9F-A935-4DF5-9717-A595449C0EBF}" srcOrd="3" destOrd="0" parTransId="{DD3CDE15-0847-4304-9708-3839C7503FCE}" sibTransId="{74205D37-C4FC-43A6-BE89-7DCA7E1F9717}"/>
+    <dgm:cxn modelId="{28A0483F-115D-4549-AF5B-0E99FE5D4FBA}" type="presParOf" srcId="{DC4AC02F-D5BA-4A28-979A-CD99B5AE9BBC}" destId="{487FAA2F-F228-41B7-BC5F-FBD7D1110CB3}" srcOrd="0" destOrd="0" presId="urn:microsoft.com/office/officeart/2018/5/layout/IconLeafLabelList"/>
+    <dgm:cxn modelId="{DFC402BA-BCD6-4FAA-9155-D2984636C9D6}" type="presParOf" srcId="{487FAA2F-F228-41B7-BC5F-FBD7D1110CB3}" destId="{A29E99C5-61CD-4F4C-8EC2-274C5B64A599}" srcOrd="0" destOrd="0" presId="urn:microsoft.com/office/officeart/2018/5/layout/IconLeafLabelList"/>
+    <dgm:cxn modelId="{0395378A-369F-4488-9F42-80DAF47BC49B}" type="presParOf" srcId="{487FAA2F-F228-41B7-BC5F-FBD7D1110CB3}" destId="{DD1B885E-07DD-4749-99EF-B2EC3FDA3992}" srcOrd="1" destOrd="0" presId="urn:microsoft.com/office/officeart/2018/5/layout/IconLeafLabelList"/>
+    <dgm:cxn modelId="{CA6D7A30-607F-42DF-BCF7-91B14368559A}" type="presParOf" srcId="{487FAA2F-F228-41B7-BC5F-FBD7D1110CB3}" destId="{127B2AD1-56F2-4AF3-AF8B-61D2166DFD94}" srcOrd="2" destOrd="0" presId="urn:microsoft.com/office/officeart/2018/5/layout/IconLeafLabelList"/>
+    <dgm:cxn modelId="{AF8FE5A3-F496-4AA4-BEF3-7149615741E3}" type="presParOf" srcId="{487FAA2F-F228-41B7-BC5F-FBD7D1110CB3}" destId="{E0454BDA-BE3E-44FB-94FF-1D6F636F52A2}" srcOrd="3" destOrd="0" presId="urn:microsoft.com/office/officeart/2018/5/layout/IconLeafLabelList"/>
+    <dgm:cxn modelId="{2804C028-C766-4CC3-80FD-29107F2DD201}" type="presParOf" srcId="{DC4AC02F-D5BA-4A28-979A-CD99B5AE9BBC}" destId="{2BAA1A67-6C05-48FD-8449-941474F946C5}" srcOrd="1" destOrd="0" presId="urn:microsoft.com/office/officeart/2018/5/layout/IconLeafLabelList"/>
+    <dgm:cxn modelId="{50C5DF06-92E0-4054-9625-79713B104172}" type="presParOf" srcId="{DC4AC02F-D5BA-4A28-979A-CD99B5AE9BBC}" destId="{A7ACCA1A-E388-433C-ACE5-080F94265B5C}" srcOrd="2" destOrd="0" presId="urn:microsoft.com/office/officeart/2018/5/layout/IconLeafLabelList"/>
+    <dgm:cxn modelId="{CADC31E1-E4D4-4C23-8231-D1AFE576FF09}" type="presParOf" srcId="{A7ACCA1A-E388-433C-ACE5-080F94265B5C}" destId="{64E685C7-48C5-408D-829E-D84DAB553A87}" srcOrd="0" destOrd="0" presId="urn:microsoft.com/office/officeart/2018/5/layout/IconLeafLabelList"/>
+    <dgm:cxn modelId="{17B1A4AB-8367-41DD-AF70-6B257FD45A52}" type="presParOf" srcId="{A7ACCA1A-E388-433C-ACE5-080F94265B5C}" destId="{91D0E9FC-0453-434B-81A4-F8D592CC2A35}" srcOrd="1" destOrd="0" presId="urn:microsoft.com/office/officeart/2018/5/layout/IconLeafLabelList"/>
+    <dgm:cxn modelId="{08BA2C40-F1E5-487B-9F41-E06CA48C578E}" type="presParOf" srcId="{A7ACCA1A-E388-433C-ACE5-080F94265B5C}" destId="{8EB0A249-DC02-4B93-A87F-36E6EC8DF9D1}" srcOrd="2" destOrd="0" presId="urn:microsoft.com/office/officeart/2018/5/layout/IconLeafLabelList"/>
+    <dgm:cxn modelId="{315284AB-651B-4574-A53B-5C8C64B2CED4}" type="presParOf" srcId="{A7ACCA1A-E388-433C-ACE5-080F94265B5C}" destId="{6718CC1F-304B-4C1C-9C4A-8437F7E90DE5}" srcOrd="3" destOrd="0" presId="urn:microsoft.com/office/officeart/2018/5/layout/IconLeafLabelList"/>
+    <dgm:cxn modelId="{0E1AC731-49A0-41D3-879A-BBE1F3A24594}" type="presParOf" srcId="{DC4AC02F-D5BA-4A28-979A-CD99B5AE9BBC}" destId="{FA2C1D61-E625-40EB-8D5F-A97BECD0E014}" srcOrd="3" destOrd="0" presId="urn:microsoft.com/office/officeart/2018/5/layout/IconLeafLabelList"/>
+    <dgm:cxn modelId="{9DCD7F64-4AD9-4439-B401-8A874204FAA3}" type="presParOf" srcId="{DC4AC02F-D5BA-4A28-979A-CD99B5AE9BBC}" destId="{87889843-BB43-437B-9515-0030D4A5402B}" srcOrd="4" destOrd="0" presId="urn:microsoft.com/office/officeart/2018/5/layout/IconLeafLabelList"/>
+    <dgm:cxn modelId="{43D29BE1-F82F-48FD-9927-EE65EA39FDE6}" type="presParOf" srcId="{87889843-BB43-437B-9515-0030D4A5402B}" destId="{4E583FB2-9103-4C12-9DDD-6D4135381072}" srcOrd="0" destOrd="0" presId="urn:microsoft.com/office/officeart/2018/5/layout/IconLeafLabelList"/>
+    <dgm:cxn modelId="{7C13F18D-ED69-485E-86E5-5E13B374E43D}" type="presParOf" srcId="{87889843-BB43-437B-9515-0030D4A5402B}" destId="{B369BE71-5E31-4C28-A810-B7793A802C21}" srcOrd="1" destOrd="0" presId="urn:microsoft.com/office/officeart/2018/5/layout/IconLeafLabelList"/>
+    <dgm:cxn modelId="{68D83875-5673-419D-9C82-9D71495D1B74}" type="presParOf" srcId="{87889843-BB43-437B-9515-0030D4A5402B}" destId="{13AA6616-4331-46E3-B9BD-BD3039B666BC}" srcOrd="2" destOrd="0" presId="urn:microsoft.com/office/officeart/2018/5/layout/IconLeafLabelList"/>
+    <dgm:cxn modelId="{9472D55D-E824-4514-A643-217C6A0A6517}" type="presParOf" srcId="{87889843-BB43-437B-9515-0030D4A5402B}" destId="{D605DE3E-38B7-4866-8160-02CAFD82A033}" srcOrd="3" destOrd="0" presId="urn:microsoft.com/office/officeart/2018/5/layout/IconLeafLabelList"/>
+    <dgm:cxn modelId="{4D05DD41-80BE-46C2-8F5D-CB3CC7E48336}" type="presParOf" srcId="{DC4AC02F-D5BA-4A28-979A-CD99B5AE9BBC}" destId="{845DA130-4D43-4E95-93ED-79209D3480B8}" srcOrd="5" destOrd="0" presId="urn:microsoft.com/office/officeart/2018/5/layout/IconLeafLabelList"/>
+    <dgm:cxn modelId="{2866FADC-1701-44D6-90D6-7EF4212AA8F0}" type="presParOf" srcId="{DC4AC02F-D5BA-4A28-979A-CD99B5AE9BBC}" destId="{6E708299-FFC7-49AC-BE53-7B604D84FF4E}" srcOrd="6" destOrd="0" presId="urn:microsoft.com/office/officeart/2018/5/layout/IconLeafLabelList"/>
+    <dgm:cxn modelId="{34B3CEE8-1C07-4415-84F5-BE3E52B0397E}" type="presParOf" srcId="{6E708299-FFC7-49AC-BE53-7B604D84FF4E}" destId="{0A4CA08E-A087-4DB4-990B-AFF04BD9D28B}" srcOrd="0" destOrd="0" presId="urn:microsoft.com/office/officeart/2018/5/layout/IconLeafLabelList"/>
+    <dgm:cxn modelId="{B3BBD1B7-1D22-4C1E-ACC9-ABF98F1C8935}" type="presParOf" srcId="{6E708299-FFC7-49AC-BE53-7B604D84FF4E}" destId="{8400DD4C-38F9-4056-93D0-D4424B77D865}" srcOrd="1" destOrd="0" presId="urn:microsoft.com/office/officeart/2018/5/layout/IconLeafLabelList"/>
+    <dgm:cxn modelId="{5DDAB654-A366-4F54-8ED4-2C2AA6A7E6A1}" type="presParOf" srcId="{6E708299-FFC7-49AC-BE53-7B604D84FF4E}" destId="{9F5A2D1F-441B-4F8B-A0C6-370C1A02E678}" srcOrd="2" destOrd="0" presId="urn:microsoft.com/office/officeart/2018/5/layout/IconLeafLabelList"/>
+    <dgm:cxn modelId="{6D11FD9D-32D6-4453-AD4D-AAE8F0737F70}" type="presParOf" srcId="{6E708299-FFC7-49AC-BE53-7B604D84FF4E}" destId="{6DCEA4BC-39A5-4150-A7BD-875EACADB5DF}" srcOrd="3" destOrd="0" presId="urn:microsoft.com/office/officeart/2018/5/layout/IconLeafLabelList"/>
+  </dgm:cxnLst>
+  <dgm:bg/>
+  <dgm:whole/>
+  <dgm:extLst>
+    <a:ext uri="http://schemas.microsoft.com/office/drawing/2008/diagram">
+      <dsp:dataModelExt xmlns:dsp="http://schemas.microsoft.com/office/drawing/2008/diagram" relId="rId6" minVer="http://schemas.openxmlformats.org/drawingml/2006/diagram"/>
+    </a:ext>
+  </dgm:extLst>
+</dgm:dataModel>
+</file>
+
+<file path=ppt/diagrams/drawing1.xml><?xml version="1.0" encoding="utf-8"?>
+<dsp:drawing xmlns:dgm="http://schemas.openxmlformats.org/drawingml/2006/diagram" xmlns:dsp="http://schemas.microsoft.com/office/drawing/2008/diagram" xmlns:a="http://schemas.openxmlformats.org/drawingml/2006/main">
+  <dsp:spTree>
+    <dsp:nvGrpSpPr>
+      <dsp:cNvPr id="0" name=""/>
+      <dsp:cNvGrpSpPr/>
+    </dsp:nvGrpSpPr>
+    <dsp:grpSpPr/>
+    <dsp:sp modelId="{A29E99C5-61CD-4F4C-8EC2-274C5B64A599}">
+      <dsp:nvSpPr>
+        <dsp:cNvPr id="0" name=""/>
+        <dsp:cNvSpPr/>
+      </dsp:nvSpPr>
+      <dsp:spPr>
+        <a:xfrm>
+          <a:off x="1374172" y="6563"/>
+          <a:ext cx="1383804" cy="1383804"/>
+        </a:xfrm>
+        <a:prstGeom prst="round2DiagRect">
+          <a:avLst>
+            <a:gd name="adj1" fmla="val 29727"/>
+            <a:gd name="adj2" fmla="val 0"/>
+          </a:avLst>
+        </a:prstGeom>
+        <a:solidFill>
+          <a:schemeClr val="bg1">
+            <a:lumMod val="95000"/>
+            <a:hueOff val="0"/>
+            <a:satOff val="0"/>
+            <a:lumOff val="0"/>
+            <a:alphaOff val="0"/>
+          </a:schemeClr>
+        </a:solidFill>
+        <a:ln>
+          <a:noFill/>
+        </a:ln>
+        <a:effectLst/>
+      </dsp:spPr>
+      <dsp:style>
+        <a:lnRef idx="0">
+          <a:scrgbClr r="0" g="0" b="0"/>
+        </a:lnRef>
+        <a:fillRef idx="1">
+          <a:scrgbClr r="0" g="0" b="0"/>
+        </a:fillRef>
+        <a:effectRef idx="0">
+          <a:scrgbClr r="0" g="0" b="0"/>
+        </a:effectRef>
+        <a:fontRef idx="minor"/>
+      </dsp:style>
+    </dsp:sp>
+    <dsp:sp modelId="{DD1B885E-07DD-4749-99EF-B2EC3FDA3992}">
+      <dsp:nvSpPr>
+        <dsp:cNvPr id="0" name=""/>
+        <dsp:cNvSpPr/>
+      </dsp:nvSpPr>
+      <dsp:spPr>
+        <a:xfrm>
+          <a:off x="1669081" y="301473"/>
+          <a:ext cx="793986" cy="793986"/>
+        </a:xfrm>
+        <a:prstGeom prst="rect">
+          <a:avLst/>
+        </a:prstGeom>
+        <a:blipFill>
+          <a:blip xmlns:r="http://schemas.openxmlformats.org/officeDocument/2006/relationships" r:embed="rId1">
+            <a:extLst>
+              <a:ext uri="{28A0092B-C50C-407E-A947-70E740481C1C}">
+                <a14:useLocalDpi xmlns:a14="http://schemas.microsoft.com/office/drawing/2010/main" val="0"/>
+              </a:ext>
+              <a:ext uri="{96DAC541-7B7A-43D3-8B79-37D633B846F1}">
+                <asvg:svgBlip xmlns:asvg="http://schemas.microsoft.com/office/drawing/2016/SVG/main" r:embed="rId2"/>
+              </a:ext>
+            </a:extLst>
+          </a:blip>
+          <a:stretch>
+            <a:fillRect/>
+          </a:stretch>
+        </a:blipFill>
+        <a:ln w="15875" cap="flat" cmpd="sng" algn="ctr">
+          <a:noFill/>
+          <a:prstDash val="solid"/>
+        </a:ln>
+        <a:effectLst/>
+      </dsp:spPr>
+      <dsp:style>
+        <a:lnRef idx="2">
+          <a:scrgbClr r="0" g="0" b="0"/>
+        </a:lnRef>
+        <a:fillRef idx="1">
+          <a:scrgbClr r="0" g="0" b="0"/>
+        </a:fillRef>
+        <a:effectRef idx="0">
+          <a:scrgbClr r="0" g="0" b="0"/>
+        </a:effectRef>
+        <a:fontRef idx="minor">
+          <a:schemeClr val="lt1"/>
+        </a:fontRef>
+      </dsp:style>
+    </dsp:sp>
+    <dsp:sp modelId="{E0454BDA-BE3E-44FB-94FF-1D6F636F52A2}">
+      <dsp:nvSpPr>
+        <dsp:cNvPr id="0" name=""/>
+        <dsp:cNvSpPr/>
+      </dsp:nvSpPr>
+      <dsp:spPr>
+        <a:xfrm>
+          <a:off x="931808" y="1821389"/>
+          <a:ext cx="2268532" cy="720000"/>
+        </a:xfrm>
+        <a:prstGeom prst="rect">
+          <a:avLst/>
+        </a:prstGeom>
+        <a:noFill/>
+        <a:ln>
+          <a:noFill/>
+        </a:ln>
+        <a:effectLst/>
+      </dsp:spPr>
+      <dsp:style>
+        <a:lnRef idx="0">
+          <a:scrgbClr r="0" g="0" b="0"/>
+        </a:lnRef>
+        <a:fillRef idx="0">
+          <a:scrgbClr r="0" g="0" b="0"/>
+        </a:fillRef>
+        <a:effectRef idx="0">
+          <a:scrgbClr r="0" g="0" b="0"/>
+        </a:effectRef>
+        <a:fontRef idx="minor"/>
+      </dsp:style>
+      <dsp:txBody>
+        <a:bodyPr spcFirstLastPara="0" vert="horz" wrap="square" lIns="0" tIns="0" rIns="0" bIns="0" numCol="1" spcCol="1270" anchor="t" anchorCtr="0">
+          <a:noAutofit/>
+        </a:bodyPr>
+        <a:lstStyle/>
+        <a:p>
+          <a:pPr marL="0" lvl="0" indent="0" algn="ctr" defTabSz="666750">
+            <a:lnSpc>
+              <a:spcPct val="100000"/>
+            </a:lnSpc>
+            <a:spcBef>
+              <a:spcPct val="0"/>
+            </a:spcBef>
+            <a:spcAft>
+              <a:spcPct val="35000"/>
+            </a:spcAft>
+            <a:buNone/>
+            <a:defRPr cap="all"/>
+          </a:pPr>
+          <a:r>
+            <a:rPr lang="en-US" sz="1500" kern="1200" dirty="0">
+              <a:latin typeface="+mn-lt"/>
+            </a:rPr>
+            <a:t>Developed by the </a:t>
+          </a:r>
+          <a:r>
+            <a:rPr lang="en-US" sz="1500" kern="1200" dirty="0">
+              <a:latin typeface="+mn-lt"/>
+              <a:hlinkClick xmlns:r="http://schemas.openxmlformats.org/officeDocument/2006/relationships" r:id="rId3"/>
+            </a:rPr>
+            <a:t>Apache Software Foundation</a:t>
+          </a:r>
+          <a:endParaRPr lang="en-US" sz="1500" kern="1200" dirty="0">
+            <a:latin typeface="+mn-lt"/>
+          </a:endParaRPr>
+        </a:p>
+      </dsp:txBody>
+      <dsp:txXfrm>
+        <a:off x="931808" y="1821389"/>
+        <a:ext cx="2268532" cy="720000"/>
+      </dsp:txXfrm>
+    </dsp:sp>
+    <dsp:sp modelId="{64E685C7-48C5-408D-829E-D84DAB553A87}">
+      <dsp:nvSpPr>
+        <dsp:cNvPr id="0" name=""/>
+        <dsp:cNvSpPr/>
+      </dsp:nvSpPr>
+      <dsp:spPr>
+        <a:xfrm>
+          <a:off x="4039697" y="6563"/>
+          <a:ext cx="1383804" cy="1383804"/>
+        </a:xfrm>
+        <a:prstGeom prst="round2DiagRect">
+          <a:avLst>
+            <a:gd name="adj1" fmla="val 29727"/>
+            <a:gd name="adj2" fmla="val 0"/>
+          </a:avLst>
+        </a:prstGeom>
+        <a:solidFill>
+          <a:schemeClr val="bg1">
+            <a:lumMod val="95000"/>
+            <a:hueOff val="0"/>
+            <a:satOff val="0"/>
+            <a:lumOff val="0"/>
+            <a:alphaOff val="0"/>
+          </a:schemeClr>
+        </a:solidFill>
+        <a:ln>
+          <a:noFill/>
+        </a:ln>
+        <a:effectLst/>
+      </dsp:spPr>
+      <dsp:style>
+        <a:lnRef idx="0">
+          <a:scrgbClr r="0" g="0" b="0"/>
+        </a:lnRef>
+        <a:fillRef idx="1">
+          <a:scrgbClr r="0" g="0" b="0"/>
+        </a:fillRef>
+        <a:effectRef idx="0">
+          <a:scrgbClr r="0" g="0" b="0"/>
+        </a:effectRef>
+        <a:fontRef idx="minor"/>
+      </dsp:style>
+    </dsp:sp>
+    <dsp:sp modelId="{91D0E9FC-0453-434B-81A4-F8D592CC2A35}">
+      <dsp:nvSpPr>
+        <dsp:cNvPr id="0" name=""/>
+        <dsp:cNvSpPr/>
+      </dsp:nvSpPr>
+      <dsp:spPr>
+        <a:xfrm>
+          <a:off x="4334606" y="301473"/>
+          <a:ext cx="793986" cy="793986"/>
+        </a:xfrm>
+        <a:prstGeom prst="rect">
+          <a:avLst/>
+        </a:prstGeom>
+        <a:blipFill>
+          <a:blip xmlns:r="http://schemas.openxmlformats.org/officeDocument/2006/relationships" r:embed="rId4">
+            <a:extLst>
+              <a:ext uri="{28A0092B-C50C-407E-A947-70E740481C1C}">
+                <a14:useLocalDpi xmlns:a14="http://schemas.microsoft.com/office/drawing/2010/main" val="0"/>
+              </a:ext>
+              <a:ext uri="{96DAC541-7B7A-43D3-8B79-37D633B846F1}">
+                <asvg:svgBlip xmlns:asvg="http://schemas.microsoft.com/office/drawing/2016/SVG/main" r:embed="rId5"/>
+              </a:ext>
+            </a:extLst>
+          </a:blip>
+          <a:stretch>
+            <a:fillRect/>
+          </a:stretch>
+        </a:blipFill>
+        <a:ln w="15875" cap="flat" cmpd="sng" algn="ctr">
+          <a:noFill/>
+          <a:prstDash val="solid"/>
+        </a:ln>
+        <a:effectLst/>
+      </dsp:spPr>
+      <dsp:style>
+        <a:lnRef idx="2">
+          <a:scrgbClr r="0" g="0" b="0"/>
+        </a:lnRef>
+        <a:fillRef idx="1">
+          <a:scrgbClr r="0" g="0" b="0"/>
+        </a:fillRef>
+        <a:effectRef idx="0">
+          <a:scrgbClr r="0" g="0" b="0"/>
+        </a:effectRef>
+        <a:fontRef idx="minor">
+          <a:schemeClr val="lt1"/>
+        </a:fontRef>
+      </dsp:style>
+    </dsp:sp>
+    <dsp:sp modelId="{6718CC1F-304B-4C1C-9C4A-8437F7E90DE5}">
+      <dsp:nvSpPr>
+        <dsp:cNvPr id="0" name=""/>
+        <dsp:cNvSpPr/>
+      </dsp:nvSpPr>
+      <dsp:spPr>
+        <a:xfrm>
+          <a:off x="3597334" y="1821389"/>
+          <a:ext cx="2268532" cy="720000"/>
+        </a:xfrm>
+        <a:prstGeom prst="rect">
+          <a:avLst/>
+        </a:prstGeom>
+        <a:noFill/>
+        <a:ln>
+          <a:noFill/>
+        </a:ln>
+        <a:effectLst/>
+      </dsp:spPr>
+      <dsp:style>
+        <a:lnRef idx="0">
+          <a:scrgbClr r="0" g="0" b="0"/>
+        </a:lnRef>
+        <a:fillRef idx="0">
+          <a:scrgbClr r="0" g="0" b="0"/>
+        </a:fillRef>
+        <a:effectRef idx="0">
+          <a:scrgbClr r="0" g="0" b="0"/>
+        </a:effectRef>
+        <a:fontRef idx="minor"/>
+      </dsp:style>
+      <dsp:txBody>
+        <a:bodyPr spcFirstLastPara="0" vert="horz" wrap="square" lIns="0" tIns="0" rIns="0" bIns="0" numCol="1" spcCol="1270" anchor="t" anchorCtr="0">
+          <a:noAutofit/>
+        </a:bodyPr>
+        <a:lstStyle/>
+        <a:p>
+          <a:pPr marL="0" lvl="0" indent="0" algn="ctr" defTabSz="666750">
+            <a:lnSpc>
+              <a:spcPct val="100000"/>
+            </a:lnSpc>
+            <a:spcBef>
+              <a:spcPct val="0"/>
+            </a:spcBef>
+            <a:spcAft>
+              <a:spcPct val="35000"/>
+            </a:spcAft>
+            <a:buNone/>
+            <a:defRPr cap="all"/>
+          </a:pPr>
+          <a:r>
+            <a:rPr lang="en-US" sz="1500" kern="1200"/>
+            <a:t>Message-oriented middleware (MOM)</a:t>
+          </a:r>
+        </a:p>
+      </dsp:txBody>
+      <dsp:txXfrm>
+        <a:off x="3597334" y="1821389"/>
+        <a:ext cx="2268532" cy="720000"/>
+      </dsp:txXfrm>
+    </dsp:sp>
+    <dsp:sp modelId="{4E583FB2-9103-4C12-9DDD-6D4135381072}">
+      <dsp:nvSpPr>
+        <dsp:cNvPr id="0" name=""/>
+        <dsp:cNvSpPr/>
+      </dsp:nvSpPr>
+      <dsp:spPr>
+        <a:xfrm>
+          <a:off x="1374172" y="3108522"/>
+          <a:ext cx="1383804" cy="1383804"/>
+        </a:xfrm>
+        <a:prstGeom prst="round2DiagRect">
+          <a:avLst>
+            <a:gd name="adj1" fmla="val 29727"/>
+            <a:gd name="adj2" fmla="val 0"/>
+          </a:avLst>
+        </a:prstGeom>
+        <a:solidFill>
+          <a:schemeClr val="bg1">
+            <a:lumMod val="95000"/>
+            <a:hueOff val="0"/>
+            <a:satOff val="0"/>
+            <a:lumOff val="0"/>
+            <a:alphaOff val="0"/>
+          </a:schemeClr>
+        </a:solidFill>
+        <a:ln>
+          <a:noFill/>
+        </a:ln>
+        <a:effectLst/>
+      </dsp:spPr>
+      <dsp:style>
+        <a:lnRef idx="0">
+          <a:scrgbClr r="0" g="0" b="0"/>
+        </a:lnRef>
+        <a:fillRef idx="1">
+          <a:scrgbClr r="0" g="0" b="0"/>
+        </a:fillRef>
+        <a:effectRef idx="0">
+          <a:scrgbClr r="0" g="0" b="0"/>
+        </a:effectRef>
+        <a:fontRef idx="minor"/>
+      </dsp:style>
+    </dsp:sp>
+    <dsp:sp modelId="{B369BE71-5E31-4C28-A810-B7793A802C21}">
+      <dsp:nvSpPr>
+        <dsp:cNvPr id="0" name=""/>
+        <dsp:cNvSpPr/>
+      </dsp:nvSpPr>
+      <dsp:spPr>
+        <a:xfrm>
+          <a:off x="1669081" y="3403431"/>
+          <a:ext cx="793986" cy="793986"/>
+        </a:xfrm>
+        <a:prstGeom prst="rect">
+          <a:avLst/>
+        </a:prstGeom>
+        <a:blipFill>
+          <a:blip xmlns:r="http://schemas.openxmlformats.org/officeDocument/2006/relationships" r:embed="rId6">
+            <a:extLst>
+              <a:ext uri="{28A0092B-C50C-407E-A947-70E740481C1C}">
+                <a14:useLocalDpi xmlns:a14="http://schemas.microsoft.com/office/drawing/2010/main" val="0"/>
+              </a:ext>
+              <a:ext uri="{96DAC541-7B7A-43D3-8B79-37D633B846F1}">
+                <asvg:svgBlip xmlns:asvg="http://schemas.microsoft.com/office/drawing/2016/SVG/main" r:embed="rId7"/>
+              </a:ext>
+            </a:extLst>
+          </a:blip>
+          <a:stretch>
+            <a:fillRect/>
+          </a:stretch>
+        </a:blipFill>
+        <a:ln w="15875" cap="flat" cmpd="sng" algn="ctr">
+          <a:noFill/>
+          <a:prstDash val="solid"/>
+        </a:ln>
+        <a:effectLst/>
+      </dsp:spPr>
+      <dsp:style>
+        <a:lnRef idx="2">
+          <a:scrgbClr r="0" g="0" b="0"/>
+        </a:lnRef>
+        <a:fillRef idx="1">
+          <a:scrgbClr r="0" g="0" b="0"/>
+        </a:fillRef>
+        <a:effectRef idx="0">
+          <a:scrgbClr r="0" g="0" b="0"/>
+        </a:effectRef>
+        <a:fontRef idx="minor">
+          <a:schemeClr val="lt1"/>
+        </a:fontRef>
+      </dsp:style>
+    </dsp:sp>
+    <dsp:sp modelId="{D605DE3E-38B7-4866-8160-02CAFD82A033}">
+      <dsp:nvSpPr>
+        <dsp:cNvPr id="0" name=""/>
+        <dsp:cNvSpPr/>
+      </dsp:nvSpPr>
+      <dsp:spPr>
+        <a:xfrm>
+          <a:off x="931808" y="4923348"/>
+          <a:ext cx="2268532" cy="720000"/>
+        </a:xfrm>
+        <a:prstGeom prst="rect">
+          <a:avLst/>
+        </a:prstGeom>
+        <a:noFill/>
+        <a:ln>
+          <a:noFill/>
+        </a:ln>
+        <a:effectLst/>
+      </dsp:spPr>
+      <dsp:style>
+        <a:lnRef idx="0">
+          <a:scrgbClr r="0" g="0" b="0"/>
+        </a:lnRef>
+        <a:fillRef idx="0">
+          <a:scrgbClr r="0" g="0" b="0"/>
+        </a:fillRef>
+        <a:effectRef idx="0">
+          <a:scrgbClr r="0" g="0" b="0"/>
+        </a:effectRef>
+        <a:fontRef idx="minor"/>
+      </dsp:style>
+      <dsp:txBody>
+        <a:bodyPr spcFirstLastPara="0" vert="horz" wrap="square" lIns="0" tIns="0" rIns="0" bIns="0" numCol="1" spcCol="1270" anchor="t" anchorCtr="0">
+          <a:noAutofit/>
+        </a:bodyPr>
+        <a:lstStyle/>
+        <a:p>
+          <a:pPr marL="0" lvl="0" indent="0" algn="ctr" defTabSz="666750">
+            <a:lnSpc>
+              <a:spcPct val="100000"/>
+            </a:lnSpc>
+            <a:spcBef>
+              <a:spcPct val="0"/>
+            </a:spcBef>
+            <a:spcAft>
+              <a:spcPct val="35000"/>
+            </a:spcAft>
+            <a:buNone/>
+            <a:defRPr cap="all"/>
+          </a:pPr>
+          <a:r>
+            <a:rPr lang="en-US" sz="1500" kern="1200"/>
+            <a:t>Allows loose coupling of the elements</a:t>
+          </a:r>
+        </a:p>
+      </dsp:txBody>
+      <dsp:txXfrm>
+        <a:off x="931808" y="4923348"/>
+        <a:ext cx="2268532" cy="720000"/>
+      </dsp:txXfrm>
+    </dsp:sp>
+    <dsp:sp modelId="{0A4CA08E-A087-4DB4-990B-AFF04BD9D28B}">
+      <dsp:nvSpPr>
+        <dsp:cNvPr id="0" name=""/>
+        <dsp:cNvSpPr/>
+      </dsp:nvSpPr>
+      <dsp:spPr>
+        <a:xfrm>
+          <a:off x="4039697" y="3108522"/>
+          <a:ext cx="1383804" cy="1383804"/>
+        </a:xfrm>
+        <a:prstGeom prst="round2DiagRect">
+          <a:avLst>
+            <a:gd name="adj1" fmla="val 29727"/>
+            <a:gd name="adj2" fmla="val 0"/>
+          </a:avLst>
+        </a:prstGeom>
+        <a:solidFill>
+          <a:schemeClr val="bg1">
+            <a:lumMod val="95000"/>
+            <a:hueOff val="0"/>
+            <a:satOff val="0"/>
+            <a:lumOff val="0"/>
+            <a:alphaOff val="0"/>
+          </a:schemeClr>
+        </a:solidFill>
+        <a:ln>
+          <a:noFill/>
+        </a:ln>
+        <a:effectLst/>
+      </dsp:spPr>
+      <dsp:style>
+        <a:lnRef idx="0">
+          <a:scrgbClr r="0" g="0" b="0"/>
+        </a:lnRef>
+        <a:fillRef idx="1">
+          <a:scrgbClr r="0" g="0" b="0"/>
+        </a:fillRef>
+        <a:effectRef idx="0">
+          <a:scrgbClr r="0" g="0" b="0"/>
+        </a:effectRef>
+        <a:fontRef idx="minor"/>
+      </dsp:style>
+    </dsp:sp>
+    <dsp:sp modelId="{8400DD4C-38F9-4056-93D0-D4424B77D865}">
+      <dsp:nvSpPr>
+        <dsp:cNvPr id="0" name=""/>
+        <dsp:cNvSpPr/>
+      </dsp:nvSpPr>
+      <dsp:spPr>
+        <a:xfrm>
+          <a:off x="4334606" y="3403431"/>
+          <a:ext cx="793986" cy="793986"/>
+        </a:xfrm>
+        <a:prstGeom prst="rect">
+          <a:avLst/>
+        </a:prstGeom>
+        <a:blipFill>
+          <a:blip xmlns:r="http://schemas.openxmlformats.org/officeDocument/2006/relationships" r:embed="rId8">
+            <a:extLst>
+              <a:ext uri="{28A0092B-C50C-407E-A947-70E740481C1C}">
+                <a14:useLocalDpi xmlns:a14="http://schemas.microsoft.com/office/drawing/2010/main" val="0"/>
+              </a:ext>
+              <a:ext uri="{96DAC541-7B7A-43D3-8B79-37D633B846F1}">
+                <asvg:svgBlip xmlns:asvg="http://schemas.microsoft.com/office/drawing/2016/SVG/main" r:embed="rId9"/>
+              </a:ext>
+            </a:extLst>
+          </a:blip>
+          <a:stretch>
+            <a:fillRect/>
+          </a:stretch>
+        </a:blipFill>
+        <a:ln w="15875" cap="flat" cmpd="sng" algn="ctr">
+          <a:noFill/>
+          <a:prstDash val="solid"/>
+        </a:ln>
+        <a:effectLst/>
+      </dsp:spPr>
+      <dsp:style>
+        <a:lnRef idx="2">
+          <a:scrgbClr r="0" g="0" b="0"/>
+        </a:lnRef>
+        <a:fillRef idx="1">
+          <a:scrgbClr r="0" g="0" b="0"/>
+        </a:fillRef>
+        <a:effectRef idx="0">
+          <a:scrgbClr r="0" g="0" b="0"/>
+        </a:effectRef>
+        <a:fontRef idx="minor">
+          <a:schemeClr val="lt1"/>
+        </a:fontRef>
+      </dsp:style>
+    </dsp:sp>
+    <dsp:sp modelId="{6DCEA4BC-39A5-4150-A7BD-875EACADB5DF}">
+      <dsp:nvSpPr>
+        <dsp:cNvPr id="0" name=""/>
+        <dsp:cNvSpPr/>
+      </dsp:nvSpPr>
+      <dsp:spPr>
+        <a:xfrm>
+          <a:off x="3597334" y="4923348"/>
+          <a:ext cx="2268532" cy="720000"/>
+        </a:xfrm>
+        <a:prstGeom prst="rect">
+          <a:avLst/>
+        </a:prstGeom>
+        <a:noFill/>
+        <a:ln>
+          <a:noFill/>
+        </a:ln>
+        <a:effectLst/>
+      </dsp:spPr>
+      <dsp:style>
+        <a:lnRef idx="0">
+          <a:scrgbClr r="0" g="0" b="0"/>
+        </a:lnRef>
+        <a:fillRef idx="0">
+          <a:scrgbClr r="0" g="0" b="0"/>
+        </a:fillRef>
+        <a:effectRef idx="0">
+          <a:scrgbClr r="0" g="0" b="0"/>
+        </a:effectRef>
+        <a:fontRef idx="minor"/>
+      </dsp:style>
+      <dsp:txBody>
+        <a:bodyPr spcFirstLastPara="0" vert="horz" wrap="square" lIns="0" tIns="0" rIns="0" bIns="0" numCol="1" spcCol="1270" anchor="t" anchorCtr="0">
+          <a:noAutofit/>
+        </a:bodyPr>
+        <a:lstStyle/>
+        <a:p>
+          <a:pPr marL="0" lvl="0" indent="0" algn="ctr" defTabSz="666750">
+            <a:lnSpc>
+              <a:spcPct val="100000"/>
+            </a:lnSpc>
+            <a:spcBef>
+              <a:spcPct val="0"/>
+            </a:spcBef>
+            <a:spcAft>
+              <a:spcPct val="35000"/>
+            </a:spcAft>
+            <a:buNone/>
+            <a:defRPr cap="all"/>
+          </a:pPr>
+          <a:r>
+            <a:rPr lang="en-US" sz="1500" kern="1200"/>
+            <a:t>Java based-makes use of the Java Message Service (JMS) API</a:t>
+          </a:r>
+        </a:p>
+      </dsp:txBody>
+      <dsp:txXfrm>
+        <a:off x="3597334" y="4923348"/>
+        <a:ext cx="2268532" cy="720000"/>
+      </dsp:txXfrm>
+    </dsp:sp>
+  </dsp:spTree>
+</dsp:drawing>
+</file>
+
+<file path=ppt/diagrams/layout1.xml><?xml version="1.0" encoding="utf-8"?>
+<dgm:layoutDef xmlns:dgm="http://schemas.openxmlformats.org/drawingml/2006/diagram" xmlns:a="http://schemas.openxmlformats.org/drawingml/2006/main" uniqueId="urn:microsoft.com/office/officeart/2018/5/layout/IconLeafLabelList">
+  <dgm:title val="Icon Leaf Label List"/>
+  <dgm:desc val="Use to show non-sequential or grouped chunks of information accompanied by a related visuals. Works best with icons or small pictures with short text captions."/>
+  <dgm:catLst>
+    <dgm:cat type="icon" pri="500"/>
+  </dgm:catLst>
+  <dgm:sampData useDef="1">
+    <dgm:dataModel>
+      <dgm:ptLst/>
+      <dgm:bg/>
+      <dgm:whole/>
+    </dgm:dataModel>
+  </dgm:sampData>
+  <dgm:styleData useDef="1">
+    <dgm:dataModel>
+      <dgm:ptLst/>
+      <dgm:bg/>
+      <dgm:whole/>
+    </dgm:dataModel>
+  </dgm:styleData>
+  <dgm:clrData useDef="1">
+    <dgm:dataModel>
+      <dgm:ptLst/>
+      <dgm:bg/>
+      <dgm:whole/>
+    </dgm:dataModel>
+  </dgm:clrData>
+  <dgm:layoutNode name="root">
+    <dgm:varLst>
+      <dgm:dir/>
+      <dgm:resizeHandles val="exact"/>
+    </dgm:varLst>
+    <dgm:choose name="Name0">
+      <dgm:if name="Name1" axis="self" func="var" arg="dir" op="equ" val="norm">
+        <dgm:alg type="snake">
+          <dgm:param type="grDir" val="tL"/>
+          <dgm:param type="flowDir" val="row"/>
+          <dgm:param type="contDir" val="sameDir"/>
+          <dgm:param type="off" val="ctr"/>
+          <dgm:param type="vertAlign" val="mid"/>
+          <dgm:param type="horzAlign" val="ctr"/>
+        </dgm:alg>
+      </dgm:if>
+      <dgm:else name="Name2">
+        <dgm:alg type="snake">
+          <dgm:param type="grDir" val="tR"/>
+          <dgm:param type="flowDir" val="row"/>
+          <dgm:param type="contDir" val="sameDir"/>
+          <dgm:param type="off" val="ctr"/>
+          <dgm:param type="vertAlign" val="mid"/>
+          <dgm:param type="horzAlign" val="ctr"/>
+        </dgm:alg>
+      </dgm:else>
+    </dgm:choose>
+    <dgm:shape xmlns:r="http://schemas.openxmlformats.org/officeDocument/2006/relationships" r:blip="">
+      <dgm:adjLst/>
+    </dgm:shape>
+    <dgm:presOf/>
+    <dgm:choose name="Name3">
+      <dgm:if name="Name4" axis="ch" ptType="node" func="cnt" op="lte" val="2">
+        <dgm:constrLst>
+          <dgm:constr type="h" for="ch" forName="compNode" refType="h" fact="0.4"/>
+          <dgm:constr type="w" for="ch" forName="compNode" val="100"/>
+          <dgm:constr type="w" for="ch" forName="sibTrans" refType="w" refFor="ch" refForName="compNode" fact="0.175"/>
+          <dgm:constr type="sp" refType="w" refFor="ch" refForName="compNode" op="equ" fact="0.25"/>
+          <dgm:constr type="primFontSz" for="des" ptType="node" op="equ" val="44"/>
+          <dgm:constr type="h" for="des" forName="compNode" op="equ"/>
+          <dgm:constr type="h" for="des" forName="textRect" op="equ"/>
+        </dgm:constrLst>
+      </dgm:if>
+      <dgm:if name="Name5" axis="ch" ptType="node" func="cnt" op="lte" val="3">
+        <dgm:constrLst>
+          <dgm:constr type="h" for="ch" forName="compNode" refType="h" fact="0.4"/>
+          <dgm:constr type="w" for="ch" forName="compNode" val="100"/>
+          <dgm:constr type="w" for="ch" forName="sibTrans" refType="w" refFor="ch" refForName="compNode" fact="0.175"/>
+          <dgm:constr type="sp" refType="w" refFor="ch" refForName="compNode" op="equ" fact="0.25"/>
+          <dgm:constr type="primFontSz" for="des" ptType="node" op="equ" val="40"/>
+          <dgm:constr type="h" for="des" forName="compNode" op="equ"/>
+          <dgm:constr type="h" for="des" forName="textRect" op="equ"/>
+        </dgm:constrLst>
+      </dgm:if>
+      <dgm:if name="Name6" axis="ch" ptType="node" func="cnt" op="lte" val="4">
+        <dgm:constrLst>
+          <dgm:constr type="h" for="ch" forName="compNode" refType="h" fact="0.4"/>
+          <dgm:constr type="w" for="ch" forName="compNode" refType="w"/>
+          <dgm:constr type="w" for="ch" forName="sibTrans" refType="w" refFor="ch" refForName="compNode" fact="0.175"/>
+          <dgm:constr type="sp" refType="w" refFor="ch" refForName="compNode" op="equ" fact="0.25"/>
+          <dgm:constr type="primFontSz" for="des" ptType="node" op="equ" val="32"/>
+          <dgm:constr type="h" for="des" forName="compNode" op="equ"/>
+          <dgm:constr type="h" for="des" forName="textRect" op="equ"/>
+        </dgm:constrLst>
+      </dgm:if>
+      <dgm:else name="Name7">
+        <dgm:constrLst>
+          <dgm:constr type="h" for="ch" forName="compNode" refType="h" fact="0.4"/>
+          <dgm:constr type="w" for="ch" forName="compNode" refType="w"/>
+          <dgm:constr type="w" for="ch" forName="sibTrans" refType="w" refFor="ch" refForName="compNode" fact="0.175"/>
+          <dgm:constr type="sp" refType="w" refFor="ch" refForName="compNode" op="equ" fact="0.25"/>
+          <dgm:constr type="primFontSz" for="des" ptType="node" op="equ" val="24"/>
+          <dgm:constr type="h" for="des" forName="compNode" op="equ"/>
+          <dgm:constr type="h" for="des" forName="textRect" op="equ"/>
+        </dgm:constrLst>
+      </dgm:else>
+    </dgm:choose>
+    <dgm:ruleLst>
+      <dgm:rule type="w" for="ch" forName="compNode" val="50" fact="NaN" max="NaN"/>
+    </dgm:ruleLst>
+    <dgm:forEach name="Name8" axis="ch" ptType="node">
+      <dgm:layoutNode name="compNode">
+        <dgm:alg type="composite"/>
+        <dgm:shape xmlns:r="http://schemas.openxmlformats.org/officeDocument/2006/relationships" r:blip="">
+          <dgm:adjLst/>
+        </dgm:shape>
+        <dgm:presOf axis="self"/>
+        <dgm:constrLst>
+          <dgm:constr type="w" for="ch" forName="iconBgRect" refType="w" fact="0.61"/>
+          <dgm:constr type="h" for="ch" forName="iconBgRect" refType="w" refFor="ch" refForName="iconBgRect"/>
+          <dgm:constr type="t" for="ch" forName="iconBgRect"/>
+          <dgm:constr type="ctrX" for="ch" forName="iconBgRect" refType="w" fact="0.5"/>
+          <dgm:constr type="w" for="ch" forName="iconRect" refType="w" fact="0.35"/>
+          <dgm:constr type="h" for="ch" forName="iconRect" refType="w" refFor="ch" refForName="iconRect"/>
+          <dgm:constr type="ctrX" for="ch" forName="iconRect" refType="ctrX" refFor="ch" refForName="iconBgRect"/>
+          <dgm:constr type="ctrY" for="ch" forName="iconRect" refType="ctrY" refFor="ch" refForName="iconBgRect"/>
+          <dgm:constr type="h" for="ch" forName="spaceRect" refType="w" fact="0.19"/>
+          <dgm:constr type="w" for="ch" forName="spaceRect" refType="w"/>
+          <dgm:constr type="l" for="ch" forName="spaceRect"/>
+          <dgm:constr type="t" for="ch" forName="spaceRect" refType="b" refFor="ch" refForName="iconBgRect"/>
+          <dgm:constr type="h" for="ch" forName="textRect" val="20"/>
+          <dgm:constr type="w" for="ch" forName="textRect" refType="w"/>
+          <dgm:constr type="l" for="ch" forName="textRect"/>
+          <dgm:constr type="t" for="ch" forName="textRect" refType="b" refFor="ch" refForName="spaceRect"/>
+        </dgm:constrLst>
+        <dgm:ruleLst>
+          <dgm:rule type="h" val="INF" fact="NaN" max="NaN"/>
+        </dgm:ruleLst>
+        <dgm:layoutNode name="iconBgRect" styleLbl="bgShp">
+          <dgm:alg type="sp"/>
+          <dgm:shape xmlns:r="http://schemas.openxmlformats.org/officeDocument/2006/relationships" type="round2DiagRect" r:blip="">
+            <dgm:adjLst/>
+            <dgm:extLst>
+              <a:ext uri="{B698B0E9-8C71-41B9-8309-B3DCBF30829C}">
+                <dgm1612:spPr xmlns:dgm1612="http://schemas.microsoft.com/office/drawing/2016/12/diagram">
+                  <a:prstGeom prst="round2DiagRect">
+                    <a:avLst>
+                      <a:gd name="adj1" fmla="val 29727"/>
+                      <a:gd name="adj2" fmla="val 0"/>
+                    </a:avLst>
+                  </a:prstGeom>
+                </dgm1612:spPr>
+              </a:ext>
+            </dgm:extLst>
+          </dgm:shape>
+          <dgm:presOf/>
+          <dgm:constrLst/>
+          <dgm:ruleLst/>
+        </dgm:layoutNode>
+        <dgm:layoutNode name="iconRect" styleLbl="node1">
+          <dgm:alg type="sp"/>
+          <dgm:shape xmlns:r="http://schemas.openxmlformats.org/officeDocument/2006/relationships" type="rect" r:blip="" blipPhldr="1">
+            <dgm:adjLst/>
+          </dgm:shape>
+          <dgm:presOf/>
+          <dgm:constrLst/>
+          <dgm:ruleLst/>
+        </dgm:layoutNode>
+        <dgm:layoutNode name="spaceRect">
+          <dgm:alg type="sp"/>
+          <dgm:shape xmlns:r="http://schemas.openxmlformats.org/officeDocument/2006/relationships" r:blip="">
+            <dgm:adjLst/>
+          </dgm:shape>
+          <dgm:presOf/>
+          <dgm:constrLst/>
+          <dgm:ruleLst/>
+        </dgm:layoutNode>
+        <dgm:layoutNode name="textRect" styleLbl="revTx">
+          <dgm:varLst>
+            <dgm:chMax val="1"/>
+            <dgm:chPref val="1"/>
+          </dgm:varLst>
+          <dgm:alg type="tx">
+            <dgm:param type="txAnchorVert" val="t"/>
+          </dgm:alg>
+          <dgm:shape xmlns:r="http://schemas.openxmlformats.org/officeDocument/2006/relationships" type="rect" r:blip="">
+            <dgm:adjLst/>
+          </dgm:shape>
+          <dgm:presOf axis="self" ptType="node"/>
+          <dgm:constrLst>
+            <dgm:constr type="lMarg"/>
+            <dgm:constr type="rMarg"/>
+            <dgm:constr type="tMarg"/>
+            <dgm:constr type="bMarg"/>
+          </dgm:constrLst>
+          <dgm:ruleLst>
+            <dgm:rule type="primFontSz" val="11" fact="NaN" max="NaN"/>
+            <dgm:rule type="h" val="INF" fact="NaN" max="NaN"/>
+          </dgm:ruleLst>
+        </dgm:layoutNode>
+      </dgm:layoutNode>
+      <dgm:forEach name="Name9" axis="followSib" ptType="sibTrans" cnt="1">
+        <dgm:layoutNode name="sibTrans">
+          <dgm:alg type="sp"/>
+          <dgm:shape xmlns:r="http://schemas.openxmlformats.org/officeDocument/2006/relationships" r:blip="">
+            <dgm:adjLst/>
+          </dgm:shape>
+          <dgm:presOf axis="self"/>
+          <dgm:constrLst/>
+          <dgm:ruleLst/>
+        </dgm:layoutNode>
+      </dgm:forEach>
+    </dgm:forEach>
+  </dgm:layoutNode>
+  <dgm:extLst>
+    <a:ext uri="{68A01E43-0DF5-4B5B-8FA6-DAF915123BFB}">
+      <dgm1612:lstStyle xmlns:dgm1612="http://schemas.microsoft.com/office/drawing/2016/12/diagram">
+        <a:lvl1pPr>
+          <a:lnSpc>
+            <a:spcPct val="100000"/>
+          </a:lnSpc>
+          <a:defRPr cap="all"/>
+        </a:lvl1pPr>
+      </dgm1612:lstStyle>
+    </a:ext>
+  </dgm:extLst>
+</dgm:layoutDef>
+</file>
+
+<file path=ppt/diagrams/quickStyle1.xml><?xml version="1.0" encoding="utf-8"?>
+<dgm:styleDef xmlns:dgm="http://schemas.openxmlformats.org/drawingml/2006/diagram" xmlns:a="http://schemas.openxmlformats.org/drawingml/2006/main" uniqueId="urn:microsoft.com/office/officeart/2005/8/quickstyle/simple1">
+  <dgm:title val=""/>
+  <dgm:desc val=""/>
+  <dgm:catLst>
+    <dgm:cat type="simple" pri="10100"/>
+  </dgm:catLst>
+  <dgm:scene3d>
+    <a:camera prst="orthographicFront"/>
+    <a:lightRig rig="threePt" dir="t"/>
+  </dgm:scene3d>
+  <dgm:styleLbl name="node0">
+    <dgm:scene3d>
+      <a:camera prst="orthographicFront"/>
+      <a:lightRig rig="threePt" dir="t"/>
+    </dgm:scene3d>
+    <dgm:sp3d/>
+    <dgm:txPr/>
+    <dgm:style>
+      <a:lnRef idx="2">
+        <a:scrgbClr r="0" g="0" b="0"/>
+      </a:lnRef>
+      <a:fillRef idx="1">
+        <a:scrgbClr r="0" g="0" b="0"/>
+      </a:fillRef>
+      <a:effectRef idx="0">
+        <a:scrgbClr r="0" g="0" b="0"/>
+      </a:effectRef>
+      <a:fontRef idx="minor">
+        <a:schemeClr val="lt1"/>
+      </a:fontRef>
+    </dgm:style>
+  </dgm:styleLbl>
+  <dgm:styleLbl name="lnNode1">
+    <dgm:scene3d>
+      <a:camera prst="orthographicFront"/>
+      <a:lightRig rig="threePt" dir="t"/>
+    </dgm:scene3d>
+    <dgm:sp3d/>
+    <dgm:txPr/>
+    <dgm:style>
+      <a:lnRef idx="2">
+        <a:scrgbClr r="0" g="0" b="0"/>
+      </a:lnRef>
+      <a:fillRef idx="1">
+        <a:scrgbClr r="0" g="0" b="0"/>
+      </a:fillRef>
+      <a:effectRef idx="0">
+        <a:scrgbClr r="0" g="0" b="0"/>
+      </a:effectRef>
+      <a:fontRef idx="minor">
+        <a:schemeClr val="lt1"/>
+      </a:fontRef>
+    </dgm:style>
+  </dgm:styleLbl>
+  <dgm:styleLbl name="vennNode1">
+    <dgm:scene3d>
+      <a:camera prst="orthographicFront"/>
+      <a:lightRig rig="threePt" dir="t"/>
+    </dgm:scene3d>
+    <dgm:sp3d/>
+    <dgm:txPr/>
+    <dgm:style>
+      <a:lnRef idx="2">
+        <a:scrgbClr r="0" g="0" b="0"/>
+      </a:lnRef>
+      <a:fillRef idx="1">
+        <a:scrgbClr r="0" g="0" b="0"/>
+      </a:fillRef>
+      <a:effectRef idx="0">
+        <a:scrgbClr r="0" g="0" b="0"/>
+      </a:effectRef>
+      <a:fontRef idx="minor">
+        <a:schemeClr val="tx1"/>
+      </a:fontRef>
+    </dgm:style>
+  </dgm:styleLbl>
+  <dgm:styleLbl name="alignNode1">
+    <dgm:scene3d>
+      <a:camera prst="orthographicFront"/>
+      <a:lightRig rig="threePt" dir="t"/>
+    </dgm:scene3d>
+    <dgm:sp3d/>
+    <dgm:txPr/>
+    <dgm:style>
+      <a:lnRef idx="2">
+        <a:scrgbClr r="0" g="0" b="0"/>
+      </a:lnRef>
+      <a:fillRef idx="1">
+        <a:scrgbClr r="0" g="0" b="0"/>
+      </a:fillRef>
+      <a:effectRef idx="0">
+        <a:scrgbClr r="0" g="0" b="0"/>
+      </a:effectRef>
+      <a:fontRef idx="minor">
+        <a:schemeClr val="lt1"/>
+      </a:fontRef>
+    </dgm:style>
+  </dgm:styleLbl>
+  <dgm:styleLbl name="node1">
+    <dgm:scene3d>
+      <a:camera prst="orthographicFront"/>
+      <a:lightRig rig="threePt" dir="t"/>
+    </dgm:scene3d>
+    <dgm:sp3d/>
+    <dgm:txPr/>
+    <dgm:style>
+      <a:lnRef idx="2">
+        <a:scrgbClr r="0" g="0" b="0"/>
+      </a:lnRef>
+      <a:fillRef idx="1">
+        <a:scrgbClr r="0" g="0" b="0"/>
+      </a:fillRef>
+      <a:effectRef idx="0">
+        <a:scrgbClr r="0" g="0" b="0"/>
+      </a:effectRef>
+      <a:fontRef idx="minor">
+        <a:schemeClr val="lt1"/>
+      </a:fontRef>
+    </dgm:style>
+  </dgm:styleLbl>
+  <dgm:styleLbl name="node2">
+    <dgm:scene3d>
+      <a:camera prst="orthographicFront"/>
+      <a:lightRig rig="threePt" dir="t"/>
+    </dgm:scene3d>
+    <dgm:sp3d/>
+    <dgm:txPr/>
+    <dgm:style>
+      <a:lnRef idx="2">
+        <a:scrgbClr r="0" g="0" b="0"/>
+      </a:lnRef>
+      <a:fillRef idx="1">
+        <a:scrgbClr r="0" g="0" b="0"/>
+      </a:fillRef>
+      <a:effectRef idx="0">
+        <a:scrgbClr r="0" g="0" b="0"/>
+      </a:effectRef>
+      <a:fontRef idx="minor">
+        <a:schemeClr val="lt1"/>
+      </a:fontRef>
+    </dgm:style>
+  </dgm:styleLbl>
+  <dgm:styleLbl name="node3">
+    <dgm:scene3d>
+      <a:camera prst="orthographicFront"/>
+      <a:lightRig rig="threePt" dir="t"/>
+    </dgm:scene3d>
+    <dgm:sp3d/>
+    <dgm:txPr/>
+    <dgm:style>
+      <a:lnRef idx="2">
+        <a:scrgbClr r="0" g="0" b="0"/>
+      </a:lnRef>
+      <a:fillRef idx="1">
+        <a:scrgbClr r="0" g="0" b="0"/>
+      </a:fillRef>
+      <a:effectRef idx="0">
+        <a:scrgbClr r="0" g="0" b="0"/>
+      </a:effectRef>
+      <a:fontRef idx="minor">
+        <a:schemeClr val="lt1"/>
+      </a:fontRef>
+    </dgm:style>
+  </dgm:styleLbl>
+  <dgm:styleLbl name="node4">
+    <dgm:scene3d>
+      <a:camera prst="orthographicFront"/>
+      <a:lightRig rig="threePt" dir="t"/>
+    </dgm:scene3d>
+    <dgm:sp3d/>
+    <dgm:txPr/>
+    <dgm:style>
+      <a:lnRef idx="2">
+        <a:scrgbClr r="0" g="0" b="0"/>
+      </a:lnRef>
+      <a:fillRef idx="1">
+        <a:scrgbClr r="0" g="0" b="0"/>
+      </a:fillRef>
+      <a:effectRef idx="0">
+        <a:scrgbClr r="0" g="0" b="0"/>
+      </a:effectRef>
+      <a:fontRef idx="minor">
+        <a:schemeClr val="lt1"/>
+      </a:fontRef>
+    </dgm:style>
+  </dgm:styleLbl>
+  <dgm:styleLbl name="fgImgPlace1">
+    <dgm:scene3d>
+      <a:camera prst="orthographicFront"/>
+      <a:lightRig rig="threePt" dir="t"/>
+    </dgm:scene3d>
+    <dgm:sp3d/>
+    <dgm:txPr/>
+    <dgm:style>
+      <a:lnRef idx="2">
+        <a:scrgbClr r="0" g="0" b="0"/>
+      </a:lnRef>
+      <a:fillRef idx="1">
+        <a:scrgbClr r="0" g="0" b="0"/>
+      </a:fillRef>
+      <a:effectRef idx="0">
+        <a:scrgbClr r="0" g="0" b="0"/>
+      </a:effectRef>
+      <a:fontRef idx="minor"/>
+    </dgm:style>
+  </dgm:styleLbl>
+  <dgm:styleLbl name="alignImgPlace1">
+    <dgm:scene3d>
+      <a:camera prst="orthographicFront"/>
+      <a:lightRig rig="threePt" dir="t"/>
+    </dgm:scene3d>
+    <dgm:sp3d/>
+    <dgm:txPr/>
+    <dgm:style>
+      <a:lnRef idx="2">
+        <a:scrgbClr r="0" g="0" b="0"/>
+      </a:lnRef>
+      <a:fillRef idx="1">
+        <a:scrgbClr r="0" g="0" b="0"/>
+      </a:fillRef>
+      <a:effectRef idx="0">
+        <a:scrgbClr r="0" g="0" b="0"/>
+      </a:effectRef>
+      <a:fontRef idx="minor"/>
+    </dgm:style>
+  </dgm:styleLbl>
+  <dgm:styleLbl name="bgImgPlace1">
+    <dgm:scene3d>
+      <a:camera prst="orthographicFront"/>
+      <a:lightRig rig="threePt" dir="t"/>
+    </dgm:scene3d>
+    <dgm:sp3d/>
+    <dgm:txPr/>
+    <dgm:style>
+      <a:lnRef idx="2">
+        <a:scrgbClr r="0" g="0" b="0"/>
+      </a:lnRef>
+      <a:fillRef idx="1">
+        <a:scrgbClr r="0" g="0" b="0"/>
+      </a:fillRef>
+      <a:effectRef idx="0">
+        <a:scrgbClr r="0" g="0" b="0"/>
+      </a:effectRef>
+      <a:fontRef idx="minor"/>
+    </dgm:style>
+  </dgm:styleLbl>
+  <dgm:styleLbl name="sibTrans2D1">
+    <dgm:scene3d>
+      <a:camera prst="orthographicFront"/>
+      <a:lightRig rig="threePt" dir="t"/>
+    </dgm:scene3d>
+    <dgm:sp3d/>
+    <dgm:txPr/>
+    <dgm:style>
+      <a:lnRef idx="0">
+        <a:scrgbClr r="0" g="0" b="0"/>
+      </a:lnRef>
+      <a:fillRef idx="1">
+        <a:scrgbClr r="0" g="0" b="0"/>
+      </a:fillRef>
+      <a:effectRef idx="0">
+        <a:scrgbClr r="0" g="0" b="0"/>
+      </a:effectRef>
+      <a:fontRef idx="minor">
+        <a:schemeClr val="lt1"/>
+      </a:fontRef>
+    </dgm:style>
+  </dgm:styleLbl>
+  <dgm:styleLbl name="fgSibTrans2D1">
+    <dgm:scene3d>
+      <a:camera prst="orthographicFront"/>
+      <a:lightRig rig="threePt" dir="t"/>
+    </dgm:scene3d>
+    <dgm:sp3d/>
+    <dgm:txPr/>
+    <dgm:style>
+      <a:lnRef idx="0">
+        <a:scrgbClr r="0" g="0" b="0"/>
+      </a:lnRef>
+      <a:fillRef idx="1">
+        <a:scrgbClr r="0" g="0" b="0"/>
+      </a:fillRef>
+      <a:effectRef idx="0">
+        <a:scrgbClr r="0" g="0" b="0"/>
+      </a:effectRef>
+      <a:fontRef idx="minor">
+        <a:schemeClr val="lt1"/>
+      </a:fontRef>
+    </dgm:style>
+  </dgm:styleLbl>
+  <dgm:styleLbl name="bgSibTrans2D1">
+    <dgm:scene3d>
+      <a:camera prst="orthographicFront"/>
+      <a:lightRig rig="threePt" dir="t"/>
+    </dgm:scene3d>
+    <dgm:sp3d/>
+    <dgm:txPr/>
+    <dgm:style>
+      <a:lnRef idx="0">
+        <a:scrgbClr r="0" g="0" b="0"/>
+      </a:lnRef>
+      <a:fillRef idx="1">
+        <a:scrgbClr r="0" g="0" b="0"/>
+      </a:fillRef>
+      <a:effectRef idx="0">
+        <a:scrgbClr r="0" g="0" b="0"/>
+      </a:effectRef>
+      <a:fontRef idx="minor">
+        <a:schemeClr val="lt1"/>
+      </a:fontRef>
+    </dgm:style>
+  </dgm:styleLbl>
+  <dgm:styleLbl name="sibTrans1D1">
+    <dgm:scene3d>
+      <a:camera prst="orthographicFront"/>
+      <a:lightRig rig="threePt" dir="t"/>
+    </dgm:scene3d>
+    <dgm:sp3d/>
+    <dgm:txPr/>
+    <dgm:style>
+      <a:lnRef idx="1">
+        <a:scrgbClr r="0" g="0" b="0"/>
+      </a:lnRef>
+      <a:fillRef idx="0">
+        <a:scrgbClr r="0" g="0" b="0"/>
+      </a:fillRef>
+      <a:effectRef idx="0">
+        <a:scrgbClr r="0" g="0" b="0"/>
+      </a:effectRef>
+      <a:fontRef idx="minor"/>
+    </dgm:style>
+  </dgm:styleLbl>
+  <dgm:styleLbl name="callout">
+    <dgm:scene3d>
+      <a:camera prst="orthographicFront"/>
+      <a:lightRig rig="threePt" dir="t"/>
+    </dgm:scene3d>
+    <dgm:sp3d/>
+    <dgm:txPr/>
+    <dgm:style>
+      <a:lnRef idx="2">
+        <a:scrgbClr r="0" g="0" b="0"/>
+      </a:lnRef>
+      <a:fillRef idx="1">
+        <a:scrgbClr r="0" g="0" b="0"/>
+      </a:fillRef>
+      <a:effectRef idx="0">
+        <a:scrgbClr r="0" g="0" b="0"/>
+      </a:effectRef>
+      <a:fontRef idx="minor"/>
+    </dgm:style>
+  </dgm:styleLbl>
+  <dgm:styleLbl name="asst0">
+    <dgm:scene3d>
+      <a:camera prst="orthographicFront"/>
+      <a:lightRig rig="threePt" dir="t"/>
+    </dgm:scene3d>
+    <dgm:sp3d/>
+    <dgm:txPr/>
+    <dgm:style>
+      <a:lnRef idx="2">
+        <a:scrgbClr r="0" g="0" b="0"/>
+      </a:lnRef>
+      <a:fillRef idx="1">
+        <a:scrgbClr r="0" g="0" b="0"/>
+      </a:fillRef>
+      <a:effectRef idx="0">
+        <a:scrgbClr r="0" g="0" b="0"/>
+      </a:effectRef>
+      <a:fontRef idx="minor">
+        <a:schemeClr val="lt1"/>
+      </a:fontRef>
+    </dgm:style>
+  </dgm:styleLbl>
+  <dgm:styleLbl name="asst1">
+    <dgm:scene3d>
+      <a:camera prst="orthographicFront"/>
+      <a:lightRig rig="threePt" dir="t"/>
+    </dgm:scene3d>
+    <dgm:sp3d/>
+    <dgm:txPr/>
+    <dgm:style>
+      <a:lnRef idx="2">
+        <a:scrgbClr r="0" g="0" b="0"/>
+      </a:lnRef>
+      <a:fillRef idx="1">
+        <a:scrgbClr r="0" g="0" b="0"/>
+      </a:fillRef>
+      <a:effectRef idx="0">
+        <a:scrgbClr r="0" g="0" b="0"/>
+      </a:effectRef>
+      <a:fontRef idx="minor">
+        <a:schemeClr val="lt1"/>
+      </a:fontRef>
+    </dgm:style>
+  </dgm:styleLbl>
+  <dgm:styleLbl name="asst2">
+    <dgm:scene3d>
+      <a:camera prst="orthographicFront"/>
+      <a:lightRig rig="threePt" dir="t"/>
+    </dgm:scene3d>
+    <dgm:sp3d/>
+    <dgm:txPr/>
+    <dgm:style>
+      <a:lnRef idx="2">
+        <a:scrgbClr r="0" g="0" b="0"/>
+      </a:lnRef>
+      <a:fillRef idx="1">
+        <a:scrgbClr r="0" g="0" b="0"/>
+      </a:fillRef>
+      <a:effectRef idx="0">
+        <a:scrgbClr r="0" g="0" b="0"/>
+      </a:effectRef>
+      <a:fontRef idx="minor">
+        <a:schemeClr val="lt1"/>
+      </a:fontRef>
+    </dgm:style>
+  </dgm:styleLbl>
+  <dgm:styleLbl name="asst3">
+    <dgm:scene3d>
+      <a:camera prst="orthographicFront"/>
+      <a:lightRig rig="threePt" dir="t"/>
+    </dgm:scene3d>
+    <dgm:sp3d/>
+    <dgm:txPr/>
+    <dgm:style>
+      <a:lnRef idx="2">
+        <a:scrgbClr r="0" g="0" b="0"/>
+      </a:lnRef>
+      <a:fillRef idx="1">
+        <a:scrgbClr r="0" g="0" b="0"/>
+      </a:fillRef>
+      <a:effectRef idx="0">
+        <a:scrgbClr r="0" g="0" b="0"/>
+      </a:effectRef>
+      <a:fontRef idx="minor">
+        <a:schemeClr val="lt1"/>
+      </a:fontRef>
+    </dgm:style>
+  </dgm:styleLbl>
+  <dgm:styleLbl name="asst4">
+    <dgm:scene3d>
+      <a:camera prst="orthographicFront"/>
+      <a:lightRig rig="threePt" dir="t"/>
+    </dgm:scene3d>
+    <dgm:sp3d/>
+    <dgm:txPr/>
+    <dgm:style>
+      <a:lnRef idx="2">
+        <a:scrgbClr r="0" g="0" b="0"/>
+      </a:lnRef>
+      <a:fillRef idx="1">
+        <a:scrgbClr r="0" g="0" b="0"/>
+      </a:fillRef>
+      <a:effectRef idx="0">
+        <a:scrgbClr r="0" g="0" b="0"/>
+      </a:effectRef>
+      <a:fontRef idx="minor">
+        <a:schemeClr val="lt1"/>
+      </a:fontRef>
+    </dgm:style>
+  </dgm:styleLbl>
+  <dgm:styleLbl name="parChTrans2D1">
+    <dgm:scene3d>
+      <a:camera prst="orthographicFront"/>
+      <a:lightRig rig="threePt" dir="t"/>
+    </dgm:scene3d>
+    <dgm:sp3d/>
+    <dgm:txPr/>
+    <dgm:style>
+      <a:lnRef idx="2">
+        <a:scrgbClr r="0" g="0" b="0"/>
+      </a:lnRef>
+      <a:fillRef idx="1">
+        <a:scrgbClr r="0" g="0" b="0"/>
+      </a:fillRef>
+      <a:effectRef idx="0">
+        <a:scrgbClr r="0" g="0" b="0"/>
+      </a:effectRef>
+      <a:fontRef idx="minor">
+        <a:schemeClr val="lt1"/>
+      </a:fontRef>
+    </dgm:style>
+  </dgm:styleLbl>
+  <dgm:styleLbl name="parChTrans2D2">
+    <dgm:scene3d>
+      <a:camera prst="orthographicFront"/>
+      <a:lightRig rig="threePt" dir="t"/>
+    </dgm:scene3d>
+    <dgm:sp3d/>
+    <dgm:txPr/>
+    <dgm:style>
+      <a:lnRef idx="2">
+        <a:scrgbClr r="0" g="0" b="0"/>
+      </a:lnRef>
+      <a:fillRef idx="1">
+        <a:scrgbClr r="0" g="0" b="0"/>
+      </a:fillRef>
+      <a:effectRef idx="0">
+        <a:scrgbClr r="0" g="0" b="0"/>
+      </a:effectRef>
+      <a:fontRef idx="minor">
+        <a:schemeClr val="lt1"/>
+      </a:fontRef>
+    </dgm:style>
+  </dgm:styleLbl>
+  <dgm:styleLbl name="parChTrans2D3">
+    <dgm:scene3d>
+      <a:camera prst="orthographicFront"/>
+      <a:lightRig rig="threePt" dir="t"/>
+    </dgm:scene3d>
+    <dgm:sp3d/>
+    <dgm:txPr/>
+    <dgm:style>
+      <a:lnRef idx="2">
+        <a:scrgbClr r="0" g="0" b="0"/>
+      </a:lnRef>
+      <a:fillRef idx="1">
+        <a:scrgbClr r="0" g="0" b="0"/>
+      </a:fillRef>
+      <a:effectRef idx="0">
+        <a:scrgbClr r="0" g="0" b="0"/>
+      </a:effectRef>
+      <a:fontRef idx="minor">
+        <a:schemeClr val="lt1"/>
+      </a:fontRef>
+    </dgm:style>
+  </dgm:styleLbl>
+  <dgm:styleLbl name="parChTrans2D4">
+    <dgm:scene3d>
+      <a:camera prst="orthographicFront"/>
+      <a:lightRig rig="threePt" dir="t"/>
+    </dgm:scene3d>
+    <dgm:sp3d/>
+    <dgm:txPr/>
+    <dgm:style>
+      <a:lnRef idx="2">
+        <a:scrgbClr r="0" g="0" b="0"/>
+      </a:lnRef>
+      <a:fillRef idx="1">
+        <a:scrgbClr r="0" g="0" b="0"/>
+      </a:fillRef>
+      <a:effectRef idx="0">
+        <a:scrgbClr r="0" g="0" b="0"/>
+      </a:effectRef>
+      <a:fontRef idx="minor">
+        <a:schemeClr val="lt1"/>
+      </a:fontRef>
+    </dgm:style>
+  </dgm:styleLbl>
+  <dgm:styleLbl name="parChTrans1D1">
+    <dgm:scene3d>
+      <a:camera prst="orthographicFront"/>
+      <a:lightRig rig="threePt" dir="t"/>
+    </dgm:scene3d>
+    <dgm:sp3d/>
+    <dgm:txPr/>
+    <dgm:style>
+      <a:lnRef idx="2">
+        <a:scrgbClr r="0" g="0" b="0"/>
+      </a:lnRef>
+      <a:fillRef idx="0">
+        <a:scrgbClr r="0" g="0" b="0"/>
+      </a:fillRef>
+      <a:effectRef idx="0">
+        <a:scrgbClr r="0" g="0" b="0"/>
+      </a:effectRef>
+      <a:fontRef idx="minor"/>
+    </dgm:style>
+  </dgm:styleLbl>
+  <dgm:styleLbl name="parChTrans1D2">
+    <dgm:scene3d>
+      <a:camera prst="orthographicFront"/>
+      <a:lightRig rig="threePt" dir="t"/>
+    </dgm:scene3d>
+    <dgm:sp3d/>
+    <dgm:txPr/>
+    <dgm:style>
+      <a:lnRef idx="2">
+        <a:scrgbClr r="0" g="0" b="0"/>
+      </a:lnRef>
+      <a:fillRef idx="0">
+        <a:scrgbClr r="0" g="0" b="0"/>
+      </a:fillRef>
+      <a:effectRef idx="0">
+        <a:scrgbClr r="0" g="0" b="0"/>
+      </a:effectRef>
+      <a:fontRef idx="minor"/>
+    </dgm:style>
+  </dgm:styleLbl>
+  <dgm:styleLbl name="parChTrans1D3">
+    <dgm:scene3d>
+      <a:camera prst="orthographicFront"/>
+      <a:lightRig rig="threePt" dir="t"/>
+    </dgm:scene3d>
+    <dgm:sp3d/>
+    <dgm:txPr/>
+    <dgm:style>
+      <a:lnRef idx="2">
+        <a:scrgbClr r="0" g="0" b="0"/>
+      </a:lnRef>
+      <a:fillRef idx="0">
+        <a:scrgbClr r="0" g="0" b="0"/>
+      </a:fillRef>
+      <a:effectRef idx="0">
+        <a:scrgbClr r="0" g="0" b="0"/>
+      </a:effectRef>
+      <a:fontRef idx="minor"/>
+    </dgm:style>
+  </dgm:styleLbl>
+  <dgm:styleLbl name="parChTrans1D4">
+    <dgm:scene3d>
+      <a:camera prst="orthographicFront"/>
+      <a:lightRig rig="threePt" dir="t"/>
+    </dgm:scene3d>
+    <dgm:sp3d/>
+    <dgm:txPr/>
+    <dgm:style>
+      <a:lnRef idx="2">
+        <a:scrgbClr r="0" g="0" b="0"/>
+      </a:lnRef>
+      <a:fillRef idx="0">
+        <a:scrgbClr r="0" g="0" b="0"/>
+      </a:fillRef>
+      <a:effectRef idx="0">
+        <a:scrgbClr r="0" g="0" b="0"/>
+      </a:effectRef>
+      <a:fontRef idx="minor"/>
+    </dgm:style>
+  </dgm:styleLbl>
+  <dgm:styleLbl name="fgAcc1">
+    <dgm:scene3d>
+      <a:camera prst="orthographicFront"/>
+      <a:lightRig rig="threePt" dir="t"/>
+    </dgm:scene3d>
+    <dgm:sp3d/>
+    <dgm:txPr/>
+    <dgm:style>
+      <a:lnRef idx="2">
+        <a:scrgbClr r="0" g="0" b="0"/>
+      </a:lnRef>
+      <a:fillRef idx="1">
+        <a:scrgbClr r="0" g="0" b="0"/>
+      </a:fillRef>
+      <a:effectRef idx="0">
+        <a:scrgbClr r="0" g="0" b="0"/>
+      </a:effectRef>
+      <a:fontRef idx="minor"/>
+    </dgm:style>
+  </dgm:styleLbl>
+  <dgm:styleLbl name="conFgAcc1">
+    <dgm:scene3d>
+      <a:camera prst="orthographicFront"/>
+      <a:lightRig rig="threePt" dir="t"/>
+    </dgm:scene3d>
+    <dgm:sp3d/>
+    <dgm:txPr/>
+    <dgm:style>
+      <a:lnRef idx="2">
+        <a:scrgbClr r="0" g="0" b="0"/>
+      </a:lnRef>
+      <a:fillRef idx="1">
+        <a:scrgbClr r="0" g="0" b="0"/>
+      </a:fillRef>
+      <a:effectRef idx="0">
+        <a:scrgbClr r="0" g="0" b="0"/>
+      </a:effectRef>
+      <a:fontRef idx="minor"/>
+    </dgm:style>
+  </dgm:styleLbl>
+  <dgm:styleLbl name="alignAcc1">
+    <dgm:scene3d>
+      <a:camera prst="orthographicFront"/>
+      <a:lightRig rig="threePt" dir="t"/>
+    </dgm:scene3d>
+    <dgm:sp3d/>
+    <dgm:txPr/>
+    <dgm:style>
+      <a:lnRef idx="2">
+        <a:scrgbClr r="0" g="0" b="0"/>
+      </a:lnRef>
+      <a:fillRef idx="1">
+        <a:scrgbClr r="0" g="0" b="0"/>
+      </a:fillRef>
+      <a:effectRef idx="0">
+        <a:scrgbClr r="0" g="0" b="0"/>
+      </a:effectRef>
+      <a:fontRef idx="minor"/>
+    </dgm:style>
+  </dgm:styleLbl>
+  <dgm:styleLbl name="trAlignAcc1">
+    <dgm:scene3d>
+      <a:camera prst="orthographicFront"/>
+      <a:lightRig rig="threePt" dir="t"/>
+    </dgm:scene3d>
+    <dgm:sp3d/>
+    <dgm:txPr/>
+    <dgm:style>
+      <a:lnRef idx="1">
+        <a:scrgbClr r="0" g="0" b="0"/>
+      </a:lnRef>
+      <a:fillRef idx="1">
+        <a:scrgbClr r="0" g="0" b="0"/>
+      </a:fillRef>
+      <a:effectRef idx="0">
+        <a:scrgbClr r="0" g="0" b="0"/>
+      </a:effectRef>
+      <a:fontRef idx="minor"/>
+    </dgm:style>
+  </dgm:styleLbl>
+  <dgm:styleLbl name="bgAcc1">
+    <dgm:scene3d>
+      <a:camera prst="orthographicFront"/>
+      <a:lightRig rig="threePt" dir="t"/>
+    </dgm:scene3d>
+    <dgm:sp3d/>
+    <dgm:txPr/>
+    <dgm:style>
+      <a:lnRef idx="2">
+        <a:scrgbClr r="0" g="0" b="0"/>
+      </a:lnRef>
+      <a:fillRef idx="1">
+        <a:scrgbClr r="0" g="0" b="0"/>
+      </a:fillRef>
+      <a:effectRef idx="0">
+        <a:scrgbClr r="0" g="0" b="0"/>
+      </a:effectRef>
+      <a:fontRef idx="minor"/>
+    </dgm:style>
+  </dgm:styleLbl>
+  <dgm:styleLbl name="solidFgAcc1">
+    <dgm:scene3d>
+      <a:camera prst="orthographicFront"/>
+      <a:lightRig rig="threePt" dir="t"/>
+    </dgm:scene3d>
+    <dgm:sp3d/>
+    <dgm:txPr/>
+    <dgm:style>
+      <a:lnRef idx="2">
+        <a:scrgbClr r="0" g="0" b="0"/>
+      </a:lnRef>
+      <a:fillRef idx="1">
+        <a:scrgbClr r="0" g="0" b="0"/>
+      </a:fillRef>
+      <a:effectRef idx="0">
+        <a:scrgbClr r="0" g="0" b="0"/>
+      </a:effectRef>
+      <a:fontRef idx="minor"/>
+    </dgm:style>
+  </dgm:styleLbl>
+  <dgm:styleLbl name="solidAlignAcc1">
+    <dgm:scene3d>
+      <a:camera prst="orthographicFront"/>
+      <a:lightRig rig="threePt" dir="t"/>
+    </dgm:scene3d>
+    <dgm:sp3d/>
+    <dgm:txPr/>
+    <dgm:style>
+      <a:lnRef idx="2">
+        <a:scrgbClr r="0" g="0" b="0"/>
+      </a:lnRef>
+      <a:fillRef idx="1">
+        <a:scrgbClr r="0" g="0" b="0"/>
+      </a:fillRef>
+      <a:effectRef idx="0">
+        <a:scrgbClr r="0" g="0" b="0"/>
+      </a:effectRef>
+      <a:fontRef idx="minor"/>
+    </dgm:style>
+  </dgm:styleLbl>
+  <dgm:styleLbl name="solidBgAcc1">
+    <dgm:scene3d>
+      <a:camera prst="orthographicFront"/>
+      <a:lightRig rig="threePt" dir="t"/>
+    </dgm:scene3d>
+    <dgm:sp3d/>
+    <dgm:txPr/>
+    <dgm:style>
+      <a:lnRef idx="2">
+        <a:scrgbClr r="0" g="0" b="0"/>
+      </a:lnRef>
+      <a:fillRef idx="1">
+        <a:scrgbClr r="0" g="0" b="0"/>
+      </a:fillRef>
+      <a:effectRef idx="0">
+        <a:scrgbClr r="0" g="0" b="0"/>
+      </a:effectRef>
+      <a:fontRef idx="minor"/>
+    </dgm:style>
+  </dgm:styleLbl>
+  <dgm:styleLbl name="fgAccFollowNode1">
+    <dgm:scene3d>
+      <a:camera prst="orthographicFront"/>
+      <a:lightRig rig="threePt" dir="t"/>
+    </dgm:scene3d>
+    <dgm:sp3d/>
+    <dgm:txPr/>
+    <dgm:style>
+      <a:lnRef idx="2">
+        <a:scrgbClr r="0" g="0" b="0"/>
+      </a:lnRef>
+      <a:fillRef idx="1">
+        <a:scrgbClr r="0" g="0" b="0"/>
+      </a:fillRef>
+      <a:effectRef idx="0">
+        <a:scrgbClr r="0" g="0" b="0"/>
+      </a:effectRef>
+      <a:fontRef idx="minor"/>
+    </dgm:style>
+  </dgm:styleLbl>
+  <dgm:styleLbl name="alignAccFollowNode1">
+    <dgm:scene3d>
+      <a:camera prst="orthographicFront"/>
+      <a:lightRig rig="threePt" dir="t"/>
+    </dgm:scene3d>
+    <dgm:sp3d/>
+    <dgm:txPr/>
+    <dgm:style>
+      <a:lnRef idx="2">
+        <a:scrgbClr r="0" g="0" b="0"/>
+      </a:lnRef>
+      <a:fillRef idx="1">
+        <a:scrgbClr r="0" g="0" b="0"/>
+      </a:fillRef>
+      <a:effectRef idx="0">
+        <a:scrgbClr r="0" g="0" b="0"/>
+      </a:effectRef>
+      <a:fontRef idx="minor"/>
+    </dgm:style>
+  </dgm:styleLbl>
+  <dgm:styleLbl name="bgAccFollowNode1">
+    <dgm:scene3d>
+      <a:camera prst="orthographicFront"/>
+      <a:lightRig rig="threePt" dir="t"/>
+    </dgm:scene3d>
+    <dgm:sp3d/>
+    <dgm:txPr/>
+    <dgm:style>
+      <a:lnRef idx="2">
+        <a:scrgbClr r="0" g="0" b="0"/>
+      </a:lnRef>
+      <a:fillRef idx="1">
+        <a:scrgbClr r="0" g="0" b="0"/>
+      </a:fillRef>
+      <a:effectRef idx="0">
+        <a:scrgbClr r="0" g="0" b="0"/>
+      </a:effectRef>
+      <a:fontRef idx="minor"/>
+    </dgm:style>
+  </dgm:styleLbl>
+  <dgm:styleLbl name="fgAcc0">
+    <dgm:scene3d>
+      <a:camera prst="orthographicFront"/>
+      <a:lightRig rig="threePt" dir="t"/>
+    </dgm:scene3d>
+    <dgm:sp3d/>
+    <dgm:txPr/>
+    <dgm:style>
+      <a:lnRef idx="2">
+        <a:scrgbClr r="0" g="0" b="0"/>
+      </a:lnRef>
+      <a:fillRef idx="1">
+        <a:scrgbClr r="0" g="0" b="0"/>
+      </a:fillRef>
+      <a:effectRef idx="0">
+        <a:scrgbClr r="0" g="0" b="0"/>
+      </a:effectRef>
+      <a:fontRef idx="minor"/>
+    </dgm:style>
+  </dgm:styleLbl>
+  <dgm:styleLbl name="fgAcc2">
+    <dgm:scene3d>
+      <a:camera prst="orthographicFront"/>
+      <a:lightRig rig="threePt" dir="t"/>
+    </dgm:scene3d>
+    <dgm:sp3d/>
+    <dgm:txPr/>
+    <dgm:style>
+      <a:lnRef idx="2">
+        <a:scrgbClr r="0" g="0" b="0"/>
+      </a:lnRef>
+      <a:fillRef idx="1">
+        <a:scrgbClr r="0" g="0" b="0"/>
+      </a:fillRef>
+      <a:effectRef idx="0">
+        <a:scrgbClr r="0" g="0" b="0"/>
+      </a:effectRef>
+      <a:fontRef idx="minor"/>
+    </dgm:style>
+  </dgm:styleLbl>
+  <dgm:styleLbl name="fgAcc3">
+    <dgm:scene3d>
+      <a:camera prst="orthographicFront"/>
+      <a:lightRig rig="threePt" dir="t"/>
+    </dgm:scene3d>
+    <dgm:sp3d/>
+    <dgm:txPr/>
+    <dgm:style>
+      <a:lnRef idx="2">
+        <a:scrgbClr r="0" g="0" b="0"/>
+      </a:lnRef>
+      <a:fillRef idx="1">
+        <a:scrgbClr r="0" g="0" b="0"/>
+      </a:fillRef>
+      <a:effectRef idx="0">
+        <a:scrgbClr r="0" g="0" b="0"/>
+      </a:effectRef>
+      <a:fontRef idx="minor"/>
+    </dgm:style>
+  </dgm:styleLbl>
+  <dgm:styleLbl name="fgAcc4">
+    <dgm:scene3d>
+      <a:camera prst="orthographicFront"/>
+      <a:lightRig rig="threePt" dir="t"/>
+    </dgm:scene3d>
+    <dgm:sp3d/>
+    <dgm:txPr/>
+    <dgm:style>
+      <a:lnRef idx="2">
+        <a:scrgbClr r="0" g="0" b="0"/>
+      </a:lnRef>
+      <a:fillRef idx="1">
+        <a:scrgbClr r="0" g="0" b="0"/>
+      </a:fillRef>
+      <a:effectRef idx="0">
+        <a:scrgbClr r="0" g="0" b="0"/>
+      </a:effectRef>
+      <a:fontRef idx="minor"/>
+    </dgm:style>
+  </dgm:styleLbl>
+  <dgm:styleLbl name="bgShp">
+    <dgm:scene3d>
+      <a:camera prst="orthographicFront"/>
+      <a:lightRig rig="threePt" dir="t"/>
+    </dgm:scene3d>
+    <dgm:sp3d/>
+    <dgm:txPr/>
+    <dgm:style>
+      <a:lnRef idx="0">
+        <a:scrgbClr r="0" g="0" b="0"/>
+      </a:lnRef>
+      <a:fillRef idx="1">
+        <a:scrgbClr r="0" g="0" b="0"/>
+      </a:fillRef>
+      <a:effectRef idx="0">
+        <a:scrgbClr r="0" g="0" b="0"/>
+      </a:effectRef>
+      <a:fontRef idx="minor"/>
+    </dgm:style>
+  </dgm:styleLbl>
+  <dgm:styleLbl name="dkBgShp">
+    <dgm:scene3d>
+      <a:camera prst="orthographicFront"/>
+      <a:lightRig rig="threePt" dir="t"/>
+    </dgm:scene3d>
+    <dgm:sp3d/>
+    <dgm:txPr/>
+    <dgm:style>
+      <a:lnRef idx="0">
+        <a:scrgbClr r="0" g="0" b="0"/>
+      </a:lnRef>
+      <a:fillRef idx="1">
+        <a:scrgbClr r="0" g="0" b="0"/>
+      </a:fillRef>
+      <a:effectRef idx="0">
+        <a:scrgbClr r="0" g="0" b="0"/>
+      </a:effectRef>
+      <a:fontRef idx="minor"/>
+    </dgm:style>
+  </dgm:styleLbl>
+  <dgm:styleLbl name="trBgShp">
+    <dgm:scene3d>
+      <a:camera prst="orthographicFront"/>
+      <a:lightRig rig="threePt" dir="t"/>
+    </dgm:scene3d>
+    <dgm:sp3d/>
+    <dgm:txPr/>
+    <dgm:style>
+      <a:lnRef idx="0">
+        <a:scrgbClr r="0" g="0" b="0"/>
+      </a:lnRef>
+      <a:fillRef idx="1">
+        <a:scrgbClr r="0" g="0" b="0"/>
+      </a:fillRef>
+      <a:effectRef idx="0">
+        <a:scrgbClr r="0" g="0" b="0"/>
+      </a:effectRef>
+      <a:fontRef idx="minor"/>
+    </dgm:style>
+  </dgm:styleLbl>
+  <dgm:styleLbl name="fgShp">
+    <dgm:scene3d>
+      <a:camera prst="orthographicFront"/>
+      <a:lightRig rig="threePt" dir="t"/>
+    </dgm:scene3d>
+    <dgm:sp3d/>
+    <dgm:txPr/>
+    <dgm:style>
+      <a:lnRef idx="2">
+        <a:scrgbClr r="0" g="0" b="0"/>
+      </a:lnRef>
+      <a:fillRef idx="1">
+        <a:scrgbClr r="0" g="0" b="0"/>
+      </a:fillRef>
+      <a:effectRef idx="0">
+        <a:scrgbClr r="0" g="0" b="0"/>
+      </a:effectRef>
+      <a:fontRef idx="minor"/>
+    </dgm:style>
+  </dgm:styleLbl>
+  <dgm:styleLbl name="revTx">
+    <dgm:scene3d>
+      <a:camera prst="orthographicFront"/>
+      <a:lightRig rig="threePt" dir="t"/>
+    </dgm:scene3d>
+    <dgm:sp3d/>
+    <dgm:txPr/>
+    <dgm:style>
+      <a:lnRef idx="0">
+        <a:scrgbClr r="0" g="0" b="0"/>
+      </a:lnRef>
+      <a:fillRef idx="0">
+        <a:scrgbClr r="0" g="0" b="0"/>
+      </a:fillRef>
+      <a:effectRef idx="0">
+        <a:scrgbClr r="0" g="0" b="0"/>
+      </a:effectRef>
+      <a:fontRef idx="minor"/>
+    </dgm:style>
+  </dgm:styleLbl>
+</dgm:styleDef>
+</file>
+
 <file path=ppt/slideLayouts/slideLayout1.xml><?xml version="1.0" encoding="utf-8"?>
 <p:sldLayout xmlns:a="http://schemas.openxmlformats.org/drawingml/2006/main" xmlns:r="http://schemas.openxmlformats.org/officeDocument/2006/relationships" xmlns:p="http://schemas.openxmlformats.org/presentationml/2006/main" showMasterSp="0" type="title" preserve="1">
   <p:cSld name="Title Slide">
@@ -358,7 +3525,7 @@
           <a:p>
             <a:fld id="{9184DA70-C731-4C70-880D-CCD4705E623C}" type="datetime1">
               <a:rPr lang="en-US" smtClean="0"/>
-              <a:t>12/29/2019</a:t>
+              <a:t>12/31/2019</a:t>
             </a:fld>
             <a:endParaRPr lang="en-US" dirty="0"/>
           </a:p>
@@ -546,7 +3713,7 @@
           <a:p>
             <a:fld id="{B612A279-0833-481D-8C56-F67FD0AC6C50}" type="datetime1">
               <a:rPr lang="en-US" smtClean="0"/>
-              <a:t>12/29/2019</a:t>
+              <a:t>12/31/2019</a:t>
             </a:fld>
             <a:endParaRPr lang="en-US" dirty="0"/>
           </a:p>
@@ -788,7 +3955,7 @@
           <a:p>
             <a:fld id="{6587DA83-5663-4C9C-B9AA-0B40A3DAFF81}" type="datetime1">
               <a:rPr lang="en-US" smtClean="0"/>
-              <a:t>12/29/2019</a:t>
+              <a:t>12/31/2019</a:t>
             </a:fld>
             <a:endParaRPr lang="en-US" dirty="0"/>
           </a:p>
@@ -976,7 +4143,7 @@
           <a:p>
             <a:fld id="{4BE1D723-8F53-4F53-90B0-1982A396982E}" type="datetime1">
               <a:rPr lang="en-US" smtClean="0"/>
-              <a:t>12/29/2019</a:t>
+              <a:t>12/31/2019</a:t>
             </a:fld>
             <a:endParaRPr lang="en-US" dirty="0"/>
           </a:p>
@@ -1349,7 +4516,7 @@
           <a:p>
             <a:fld id="{97669AF7-7BEB-44E4-9852-375E34362B5B}" type="datetime1">
               <a:rPr lang="en-US" smtClean="0"/>
-              <a:t>12/29/2019</a:t>
+              <a:t>12/31/2019</a:t>
             </a:fld>
             <a:endParaRPr lang="en-US" dirty="0"/>
           </a:p>
@@ -1604,7 +4771,7 @@
           <a:p>
             <a:fld id="{BAAAC38D-0552-4C82-B593-E6124DFADBE2}" type="datetime1">
               <a:rPr lang="en-US" smtClean="0"/>
-              <a:t>12/29/2019</a:t>
+              <a:t>12/31/2019</a:t>
             </a:fld>
             <a:endParaRPr lang="en-US" dirty="0"/>
           </a:p>
@@ -2001,7 +5168,7 @@
           <a:p>
             <a:fld id="{D9DF0F1C-5577-4ACB-BB62-DF8F3C494C7E}" type="datetime1">
               <a:rPr lang="en-US" smtClean="0"/>
-              <a:t>12/29/2019</a:t>
+              <a:t>12/31/2019</a:t>
             </a:fld>
             <a:endParaRPr lang="en-US" dirty="0"/>
           </a:p>
@@ -2137,7 +5304,7 @@
           <a:p>
             <a:fld id="{1775B394-D9F9-4F0C-B15D-605F45CB9E9F}" type="datetime1">
               <a:rPr lang="en-US" smtClean="0"/>
-              <a:t>12/29/2019</a:t>
+              <a:t>12/31/2019</a:t>
             </a:fld>
             <a:endParaRPr lang="en-US" dirty="0"/>
           </a:p>
@@ -2294,7 +5461,7 @@
           <a:p>
             <a:fld id="{39667345-2558-425A-8533-9BFDBCE15005}" type="datetime1">
               <a:rPr lang="en-US" smtClean="0"/>
-              <a:t>12/29/2019</a:t>
+              <a:t>12/31/2019</a:t>
             </a:fld>
             <a:endParaRPr lang="en-US" dirty="0"/>
           </a:p>
@@ -2623,7 +5790,7 @@
           <a:p>
             <a:fld id="{92BEA474-078D-4E9B-9B14-09A87B19DC46}" type="datetime1">
               <a:rPr lang="en-US" smtClean="0"/>
-              <a:t>12/29/2019</a:t>
+              <a:t>12/31/2019</a:t>
             </a:fld>
             <a:endParaRPr lang="en-US" dirty="0"/>
           </a:p>
@@ -2973,7 +6140,7 @@
           <a:p>
             <a:fld id="{4907D986-8816-4272-A432-0437A28A9828}" type="datetime1">
               <a:rPr lang="en-US" smtClean="0"/>
-              <a:t>12/29/2019</a:t>
+              <a:t>12/31/2019</a:t>
             </a:fld>
             <a:endParaRPr lang="en-US" dirty="0"/>
           </a:p>
@@ -3234,7 +6401,7 @@
           <a:p>
             <a:fld id="{62D6E202-B606-4609-B914-27C9371A1F6D}" type="datetime1">
               <a:rPr lang="en-US" smtClean="0"/>
-              <a:t>12/29/2019</a:t>
+              <a:t>12/31/2019</a:t>
             </a:fld>
             <a:endParaRPr lang="en-US" dirty="0"/>
           </a:p>
@@ -4126,7 +7293,14 @@
           <a:bodyPr/>
           <a:lstStyle/>
           <a:p>
-            <a:endParaRPr lang="en-US" dirty="0"/>
+            <a:r>
+              <a:rPr lang="en-US" dirty="0" err="1"/>
+              <a:t>Uthpala</a:t>
+            </a:r>
+            <a:r>
+              <a:rPr lang="en-US" dirty="0"/>
+              <a:t> diagram</a:t>
+            </a:r>
           </a:p>
         </p:txBody>
       </p:sp>
@@ -4151,7 +7325,7 @@
           <a:bodyPr/>
           <a:lstStyle/>
           <a:p>
-            <a:endParaRPr lang="en-US"/>
+            <a:endParaRPr lang="en-US" dirty="0"/>
           </a:p>
         </p:txBody>
       </p:sp>
@@ -4176,7 +7350,7 @@
           <a:bodyPr/>
           <a:lstStyle/>
           <a:p>
-            <a:endParaRPr lang="en-US"/>
+            <a:endParaRPr lang="en-US" dirty="0"/>
           </a:p>
         </p:txBody>
       </p:sp>
@@ -4238,12 +7412,54 @@
           </a:p>
         </p:txBody>
       </p:sp>
+      <p:sp>
+        <p:nvSpPr>
+          <p:cNvPr id="6" name="Content Placeholder 5">
+            <a:extLst>
+              <a:ext uri="{FF2B5EF4-FFF2-40B4-BE49-F238E27FC236}">
+                <a16:creationId xmlns:a16="http://schemas.microsoft.com/office/drawing/2014/main" id="{80C45F5A-3FA5-496F-A9B0-E41D70BEDFF2}"/>
+              </a:ext>
+            </a:extLst>
+          </p:cNvPr>
+          <p:cNvSpPr>
+            <a:spLocks noGrp="1"/>
+          </p:cNvSpPr>
+          <p:nvPr>
+            <p:ph sz="half" idx="2"/>
+          </p:nvPr>
+        </p:nvSpPr>
+        <p:spPr/>
+        <p:txBody>
+          <a:bodyPr/>
+          <a:lstStyle/>
+          <a:p>
+            <a:pPr>
+              <a:buFont typeface="Wingdings" panose="05000000000000000000" pitchFamily="2" charset="2"/>
+              <a:buChar char="§"/>
+            </a:pPr>
+            <a:r>
+              <a:rPr lang="en-US" dirty="0"/>
+              <a:t>Imagine that you have a web service that receives many requests every second, where no request can get lost</a:t>
+            </a:r>
+          </a:p>
+          <a:p>
+            <a:pPr>
+              <a:buFont typeface="Wingdings" panose="05000000000000000000" pitchFamily="2" charset="2"/>
+              <a:buChar char="§"/>
+            </a:pPr>
+            <a:endParaRPr lang="en-US" dirty="0"/>
+          </a:p>
+          <a:p>
+            <a:endParaRPr lang="en-US" dirty="0"/>
+          </a:p>
+        </p:txBody>
+      </p:sp>
       <p:pic>
         <p:nvPicPr>
-          <p:cNvPr id="5" name="Content Placeholder 4" descr="A picture containing toy&#10;&#10;Description automatically generated">
+          <p:cNvPr id="8" name="Content Placeholder 7" descr="A screenshot of a cell phone&#10;&#10;Description automatically generated">
             <a:extLst>
               <a:ext uri="{FF2B5EF4-FFF2-40B4-BE49-F238E27FC236}">
-                <a16:creationId xmlns:a16="http://schemas.microsoft.com/office/drawing/2014/main" id="{118FB461-D882-4238-94A9-988FA327051A}"/>
+                <a16:creationId xmlns:a16="http://schemas.microsoft.com/office/drawing/2014/main" id="{F8AFBC6A-63D3-4C0A-925F-B889A4F4DC45}"/>
               </a:ext>
             </a:extLst>
           </p:cNvPr>
@@ -4268,17 +7484,173 @@
         </p:blipFill>
         <p:spPr>
           <a:xfrm>
-            <a:off x="1315656" y="2120900"/>
-            <a:ext cx="4202876" cy="3748088"/>
+            <a:off x="1097280" y="2007220"/>
+            <a:ext cx="4640262" cy="3621667"/>
           </a:xfrm>
         </p:spPr>
       </p:pic>
-      <p:sp>
-        <p:nvSpPr>
-          <p:cNvPr id="6" name="Content Placeholder 5">
+    </p:spTree>
+    <p:extLst>
+      <p:ext uri="{BB962C8B-B14F-4D97-AF65-F5344CB8AC3E}">
+        <p14:creationId xmlns:p14="http://schemas.microsoft.com/office/powerpoint/2010/main" val="219279454"/>
+      </p:ext>
+    </p:extLst>
+  </p:cSld>
+  <p:clrMapOvr>
+    <a:masterClrMapping/>
+  </p:clrMapOvr>
+</p:sld>
+</file>
+
+<file path=ppt/slides/slide4.xml><?xml version="1.0" encoding="utf-8"?>
+<p:sld xmlns:a="http://schemas.openxmlformats.org/drawingml/2006/main" xmlns:r="http://schemas.openxmlformats.org/officeDocument/2006/relationships" xmlns:p="http://schemas.openxmlformats.org/presentationml/2006/main">
+  <p:cSld>
+    <p:bg>
+      <p:bgPr>
+        <a:solidFill>
+          <a:schemeClr val="bg1"/>
+        </a:solidFill>
+        <a:effectLst/>
+      </p:bgPr>
+    </p:bg>
+    <p:spTree>
+      <p:nvGrpSpPr>
+        <p:cNvPr id="1" name=""/>
+        <p:cNvGrpSpPr/>
+        <p:nvPr/>
+      </p:nvGrpSpPr>
+      <p:grpSpPr>
+        <a:xfrm>
+          <a:off x="0" y="0"/>
+          <a:ext cx="0" cy="0"/>
+          <a:chOff x="0" y="0"/>
+          <a:chExt cx="0" cy="0"/>
+        </a:xfrm>
+      </p:grpSpPr>
+      <p:sp useBgFill="1">
+        <p:nvSpPr>
+          <p:cNvPr id="19" name="Rectangle 18">
             <a:extLst>
               <a:ext uri="{FF2B5EF4-FFF2-40B4-BE49-F238E27FC236}">
-                <a16:creationId xmlns:a16="http://schemas.microsoft.com/office/drawing/2014/main" id="{80C45F5A-3FA5-496F-A9B0-E41D70BEDFF2}"/>
+                <a16:creationId xmlns:a16="http://schemas.microsoft.com/office/drawing/2014/main" id="{EE1530B0-6F96-46C0-8B3E-3215CB756BE4}"/>
+              </a:ext>
+              <a:ext uri="{C183D7F6-B498-43B3-948B-1728B52AA6E4}">
+                <adec:decorative xmlns:adec="http://schemas.microsoft.com/office/drawing/2017/decorative" val="1"/>
+              </a:ext>
+            </a:extLst>
+          </p:cNvPr>
+          <p:cNvSpPr>
+            <a:spLocks noGrp="1" noRot="1" noChangeAspect="1" noMove="1" noResize="1" noEditPoints="1" noAdjustHandles="1" noChangeArrowheads="1" noChangeShapeType="1" noTextEdit="1"/>
+          </p:cNvSpPr>
+          <p:nvPr>
+            <p:extLst>
+              <p:ext uri="{386F3935-93C4-4BCD-93E2-E3B085C9AB24}">
+                <p16:designElem xmlns:p16="http://schemas.microsoft.com/office/powerpoint/2015/main" val="1"/>
+              </p:ext>
+            </p:extLst>
+          </p:nvPr>
+        </p:nvSpPr>
+        <p:spPr>
+          <a:xfrm>
+            <a:off x="5685" y="0"/>
+            <a:ext cx="12186315" cy="6858000"/>
+          </a:xfrm>
+          <a:prstGeom prst="rect">
+            <a:avLst/>
+          </a:prstGeom>
+          <a:ln>
+            <a:noFill/>
+          </a:ln>
+        </p:spPr>
+        <p:style>
+          <a:lnRef idx="2">
+            <a:schemeClr val="accent6">
+              <a:shade val="50000"/>
+            </a:schemeClr>
+          </a:lnRef>
+          <a:fillRef idx="1001">
+            <a:schemeClr val="lt1"/>
+          </a:fillRef>
+          <a:effectRef idx="0">
+            <a:schemeClr val="accent6"/>
+          </a:effectRef>
+          <a:fontRef idx="minor">
+            <a:schemeClr val="lt1"/>
+          </a:fontRef>
+        </p:style>
+        <p:txBody>
+          <a:bodyPr rtlCol="0" anchor="ctr"/>
+          <a:lstStyle/>
+          <a:p>
+            <a:pPr algn="ctr"/>
+            <a:endParaRPr lang="en-US"/>
+          </a:p>
+        </p:txBody>
+      </p:sp>
+      <p:sp>
+        <p:nvSpPr>
+          <p:cNvPr id="21" name="Rectangle 20">
+            <a:extLst>
+              <a:ext uri="{FF2B5EF4-FFF2-40B4-BE49-F238E27FC236}">
+                <a16:creationId xmlns:a16="http://schemas.microsoft.com/office/drawing/2014/main" id="{754910CF-1B56-45D3-960A-E89F7B3B9131}"/>
+              </a:ext>
+              <a:ext uri="{C183D7F6-B498-43B3-948B-1728B52AA6E4}">
+                <adec:decorative xmlns:adec="http://schemas.microsoft.com/office/drawing/2017/decorative" val="1"/>
+              </a:ext>
+            </a:extLst>
+          </p:cNvPr>
+          <p:cNvSpPr>
+            <a:spLocks noGrp="1" noRot="1" noChangeAspect="1" noMove="1" noResize="1" noEditPoints="1" noAdjustHandles="1" noChangeArrowheads="1" noChangeShapeType="1" noTextEdit="1"/>
+          </p:cNvSpPr>
+          <p:nvPr>
+            <p:extLst>
+              <p:ext uri="{386F3935-93C4-4BCD-93E2-E3B085C9AB24}">
+                <p16:designElem xmlns:p16="http://schemas.microsoft.com/office/powerpoint/2015/main" val="1"/>
+              </p:ext>
+            </p:extLst>
+          </p:nvPr>
+        </p:nvSpPr>
+        <p:spPr>
+          <a:xfrm>
+            <a:off x="16" y="0"/>
+            <a:ext cx="4050791" cy="6858000"/>
+          </a:xfrm>
+          <a:prstGeom prst="rect">
+            <a:avLst/>
+          </a:prstGeom>
+          <a:solidFill>
+            <a:schemeClr val="tx1">
+              <a:lumMod val="85000"/>
+              <a:lumOff val="15000"/>
+            </a:schemeClr>
+          </a:solidFill>
+          <a:ln>
+            <a:noFill/>
+          </a:ln>
+        </p:spPr>
+        <p:style>
+          <a:lnRef idx="2">
+            <a:schemeClr val="accent1">
+              <a:shade val="50000"/>
+            </a:schemeClr>
+          </a:lnRef>
+          <a:fillRef idx="1">
+            <a:schemeClr val="accent1"/>
+          </a:fillRef>
+          <a:effectRef idx="0">
+            <a:schemeClr val="accent1"/>
+          </a:effectRef>
+          <a:fontRef idx="minor">
+            <a:schemeClr val="lt1"/>
+          </a:fontRef>
+        </p:style>
+      </p:sp>
+      <p:sp>
+        <p:nvSpPr>
+          <p:cNvPr id="2" name="Title 1">
+            <a:extLst>
+              <a:ext uri="{FF2B5EF4-FFF2-40B4-BE49-F238E27FC236}">
+                <a16:creationId xmlns:a16="http://schemas.microsoft.com/office/drawing/2014/main" id="{C5444CEA-BD6E-404A-8CBA-C1B42384DD1A}"/>
               </a:ext>
             </a:extLst>
           </p:cNvPr>
@@ -4286,7 +7658,107 @@
             <a:spLocks noGrp="1"/>
           </p:cNvSpPr>
           <p:nvPr>
-            <p:ph sz="half" idx="2"/>
+            <p:ph type="title"/>
+          </p:nvPr>
+        </p:nvSpPr>
+        <p:spPr>
+          <a:xfrm>
+            <a:off x="492370" y="516835"/>
+            <a:ext cx="3084844" cy="5772840"/>
+          </a:xfrm>
+        </p:spPr>
+        <p:txBody>
+          <a:bodyPr anchor="ctr">
+            <a:normAutofit/>
+          </a:bodyPr>
+          <a:lstStyle/>
+          <a:p>
+            <a:r>
+              <a:rPr lang="en-US" sz="3600" dirty="0">
+                <a:solidFill>
+                  <a:schemeClr val="bg1"/>
+                </a:solidFill>
+              </a:rPr>
+              <a:t>ActiveMQ by Apache</a:t>
+            </a:r>
+          </a:p>
+        </p:txBody>
+      </p:sp>
+      <p:graphicFrame>
+        <p:nvGraphicFramePr>
+          <p:cNvPr id="5" name="Content Placeholder 2">
+            <a:extLst>
+              <a:ext uri="{FF2B5EF4-FFF2-40B4-BE49-F238E27FC236}">
+                <a16:creationId xmlns:a16="http://schemas.microsoft.com/office/drawing/2014/main" id="{39ABB62E-2521-4508-BCD2-7203B746D992}"/>
+              </a:ext>
+            </a:extLst>
+          </p:cNvPr>
+          <p:cNvGraphicFramePr>
+            <a:graphicFrameLocks noGrp="1"/>
+          </p:cNvGraphicFramePr>
+          <p:nvPr>
+            <p:ph idx="1"/>
+            <p:extLst>
+              <p:ext uri="{D42A27DB-BD31-4B8C-83A1-F6EECF244321}">
+                <p14:modId xmlns:p14="http://schemas.microsoft.com/office/powerpoint/2010/main" val="811018590"/>
+              </p:ext>
+            </p:extLst>
+          </p:nvPr>
+        </p:nvGraphicFramePr>
+        <p:xfrm>
+          <a:off x="4741863" y="639763"/>
+          <a:ext cx="6797675" cy="5649912"/>
+        </p:xfrm>
+        <a:graphic>
+          <a:graphicData uri="http://schemas.openxmlformats.org/drawingml/2006/diagram">
+            <dgm:relIds xmlns:dgm="http://schemas.openxmlformats.org/drawingml/2006/diagram" xmlns:r="http://schemas.openxmlformats.org/officeDocument/2006/relationships" r:dm="rId2" r:lo="rId3" r:qs="rId4" r:cs="rId5"/>
+          </a:graphicData>
+        </a:graphic>
+      </p:graphicFrame>
+    </p:spTree>
+    <p:extLst>
+      <p:ext uri="{BB962C8B-B14F-4D97-AF65-F5344CB8AC3E}">
+        <p14:creationId xmlns:p14="http://schemas.microsoft.com/office/powerpoint/2010/main" val="1957715269"/>
+      </p:ext>
+    </p:extLst>
+  </p:cSld>
+  <p:clrMapOvr>
+    <a:masterClrMapping/>
+  </p:clrMapOvr>
+</p:sld>
+</file>
+
+<file path=ppt/slides/slide5.xml><?xml version="1.0" encoding="utf-8"?>
+<p:sld xmlns:a="http://schemas.openxmlformats.org/drawingml/2006/main" xmlns:r="http://schemas.openxmlformats.org/officeDocument/2006/relationships" xmlns:p="http://schemas.openxmlformats.org/presentationml/2006/main">
+  <p:cSld>
+    <p:spTree>
+      <p:nvGrpSpPr>
+        <p:cNvPr id="1" name=""/>
+        <p:cNvGrpSpPr/>
+        <p:nvPr/>
+      </p:nvGrpSpPr>
+      <p:grpSpPr>
+        <a:xfrm>
+          <a:off x="0" y="0"/>
+          <a:ext cx="0" cy="0"/>
+          <a:chOff x="0" y="0"/>
+          <a:chExt cx="0" cy="0"/>
+        </a:xfrm>
+      </p:grpSpPr>
+      <p:sp>
+        <p:nvSpPr>
+          <p:cNvPr id="2" name="Title 1">
+            <a:extLst>
+              <a:ext uri="{FF2B5EF4-FFF2-40B4-BE49-F238E27FC236}">
+                <a16:creationId xmlns:a16="http://schemas.microsoft.com/office/drawing/2014/main" id="{CA8B0EF9-FB90-4C75-8DD0-09EFF35E5A56}"/>
+              </a:ext>
+            </a:extLst>
+          </p:cNvPr>
+          <p:cNvSpPr>
+            <a:spLocks noGrp="1"/>
+          </p:cNvSpPr>
+          <p:nvPr>
+            <p:ph type="title"/>
           </p:nvPr>
         </p:nvSpPr>
         <p:spPr/>
@@ -4294,22 +7766,33 @@
           <a:bodyPr/>
           <a:lstStyle/>
           <a:p>
-            <a:pPr>
-              <a:buFont typeface="Wingdings" panose="05000000000000000000" pitchFamily="2" charset="2"/>
-              <a:buChar char="§"/>
-            </a:pPr>
             <a:r>
               <a:rPr lang="en-US" dirty="0"/>
-              <a:t>Imagine that you have a web service that receives many requests every second, where no request can get lost</a:t>
+              <a:t>Advantages and disadvantages</a:t>
             </a:r>
           </a:p>
-          <a:p>
-            <a:pPr>
-              <a:buFont typeface="Wingdings" panose="05000000000000000000" pitchFamily="2" charset="2"/>
-              <a:buChar char="§"/>
-            </a:pPr>
-            <a:endParaRPr lang="en-US" dirty="0"/>
-          </a:p>
+        </p:txBody>
+      </p:sp>
+      <p:sp>
+        <p:nvSpPr>
+          <p:cNvPr id="3" name="Content Placeholder 2">
+            <a:extLst>
+              <a:ext uri="{FF2B5EF4-FFF2-40B4-BE49-F238E27FC236}">
+                <a16:creationId xmlns:a16="http://schemas.microsoft.com/office/drawing/2014/main" id="{DDF2E1EE-B4CB-4A52-8114-9A13B5B6DE4A}"/>
+              </a:ext>
+            </a:extLst>
+          </p:cNvPr>
+          <p:cNvSpPr>
+            <a:spLocks noGrp="1"/>
+          </p:cNvSpPr>
+          <p:nvPr>
+            <p:ph idx="1"/>
+          </p:nvPr>
+        </p:nvSpPr>
+        <p:spPr/>
+        <p:txBody>
+          <a:bodyPr/>
+          <a:lstStyle/>
           <a:p>
             <a:endParaRPr lang="en-US" dirty="0"/>
           </a:p>
@@ -4318,7 +7801,7 @@
     </p:spTree>
     <p:extLst>
       <p:ext uri="{BB962C8B-B14F-4D97-AF65-F5344CB8AC3E}">
-        <p14:creationId xmlns:p14="http://schemas.microsoft.com/office/powerpoint/2010/main" val="219279454"/>
+        <p14:creationId xmlns:p14="http://schemas.microsoft.com/office/powerpoint/2010/main" val="1851174275"/>
       </p:ext>
     </p:extLst>
   </p:cSld>

</xml_diff>